<commit_message>
Updated for SWCGuild Akron.
</commit_message>
<xml_diff>
--- a/what-ive-learned-presentation.pptx
+++ b/what-ive-learned-presentation.pptx
@@ -5,7 +5,7 @@
     <p:sldMasterId id="2147484728" r:id="rId1"/>
   </p:sldMasterIdLst>
   <p:notesMasterIdLst>
-    <p:notesMasterId r:id="rId31"/>
+    <p:notesMasterId r:id="rId24"/>
   </p:notesMasterIdLst>
   <p:sldIdLst>
     <p:sldId id="256" r:id="rId2"/>
@@ -16,27 +16,20 @@
     <p:sldId id="260" r:id="rId7"/>
     <p:sldId id="289" r:id="rId8"/>
     <p:sldId id="262" r:id="rId9"/>
-    <p:sldId id="263" r:id="rId10"/>
-    <p:sldId id="264" r:id="rId11"/>
-    <p:sldId id="265" r:id="rId12"/>
-    <p:sldId id="266" r:id="rId13"/>
-    <p:sldId id="267" r:id="rId14"/>
-    <p:sldId id="288" r:id="rId15"/>
-    <p:sldId id="269" r:id="rId16"/>
-    <p:sldId id="279" r:id="rId17"/>
-    <p:sldId id="270" r:id="rId18"/>
-    <p:sldId id="271" r:id="rId19"/>
-    <p:sldId id="278" r:id="rId20"/>
-    <p:sldId id="272" r:id="rId21"/>
-    <p:sldId id="273" r:id="rId22"/>
-    <p:sldId id="274" r:id="rId23"/>
-    <p:sldId id="275" r:id="rId24"/>
-    <p:sldId id="277" r:id="rId25"/>
-    <p:sldId id="280" r:id="rId26"/>
-    <p:sldId id="281" r:id="rId27"/>
-    <p:sldId id="283" r:id="rId28"/>
-    <p:sldId id="285" r:id="rId29"/>
-    <p:sldId id="287" r:id="rId30"/>
+    <p:sldId id="265" r:id="rId10"/>
+    <p:sldId id="269" r:id="rId11"/>
+    <p:sldId id="279" r:id="rId12"/>
+    <p:sldId id="270" r:id="rId13"/>
+    <p:sldId id="271" r:id="rId14"/>
+    <p:sldId id="278" r:id="rId15"/>
+    <p:sldId id="273" r:id="rId16"/>
+    <p:sldId id="274" r:id="rId17"/>
+    <p:sldId id="277" r:id="rId18"/>
+    <p:sldId id="280" r:id="rId19"/>
+    <p:sldId id="281" r:id="rId20"/>
+    <p:sldId id="283" r:id="rId21"/>
+    <p:sldId id="285" r:id="rId22"/>
+    <p:sldId id="287" r:id="rId23"/>
   </p:sldIdLst>
   <p:sldSz cx="9144000" cy="6858000" type="screen4x3"/>
   <p:notesSz cx="6858000" cy="9144000"/>
@@ -220,7 +213,7 @@
           <a:p>
             <a:fld id="{1B8A3B2B-21E6-D943-9700-FA7AE98643E7}" type="datetimeFigureOut">
               <a:rPr lang="en-US" smtClean="0"/>
-              <a:t>10/24/13</a:t>
+              <a:t>9/22/14</a:t>
             </a:fld>
             <a:endParaRPr lang="en-US"/>
           </a:p>
@@ -657,34 +650,52 @@
           <a:p>
             <a:r>
               <a:rPr lang="en-US" dirty="0" smtClean="0"/>
-              <a:t>## You will regret some decisions</a:t>
-            </a:r>
-          </a:p>
-          <a:p>
-            <a:endParaRPr lang="en-US" dirty="0" smtClean="0"/>
-          </a:p>
-          <a:p>
-            <a:r>
-              <a:rPr lang="en-US" dirty="0" smtClean="0"/>
-              <a:t>A few years later I was working as a web programmer for a dot-com startup (back then we called it "webmaster"--yes, I am *that* old). The dot-com boom was in full swing, I was making good money, I was finishing up my first masters degree, I had a fat stack of (now worthless) stock options. Everything was coming together.</a:t>
-            </a:r>
-          </a:p>
-          <a:p>
-            <a:endParaRPr lang="en-US" dirty="0" smtClean="0"/>
-          </a:p>
-          <a:p>
-            <a:r>
-              <a:rPr lang="en-US" dirty="0" smtClean="0"/>
-              <a:t>I had an opportunity to go to Melbourne Australia for work for a week. Easily one of the best cities in the world. I loved every minute of it. Back then I also held several Microsoft certifications. Those certifications were hot properties back then and I was highly sought after. So I'm in Melbourne having a totally innocuous conversation with the President of a private school in the city. They were desperate for a new network manager. When he heard I had a stack of Microsoft certifications and was pursuing a masters degree he offered me a job. Just like that. Out of the blue. Asked me is I would be willing to stop by the school, meet some of the staff, and start the formal interview process. I was clearly taken aback. Oddly, my first thought was with getting a work visa. "Not a problem" he said. "We desperately need technical people in Australia. With your skills I could get you a visa by the end of the week."</a:t>
-            </a:r>
-          </a:p>
-          <a:p>
-            <a:endParaRPr lang="en-US" dirty="0" smtClean="0"/>
-          </a:p>
-          <a:p>
-            <a:r>
-              <a:rPr lang="en-US" dirty="0" smtClean="0"/>
-              <a:t>I turned down the offer. Shook his hand, said "this is very sudden so I need to think about it" and never called him back. I had a litany of excuses that seemed reasonable at the time but they were all bullshit. I was scared and I let fear make the decision for me.</a:t>
+              <a:t>## You are *not* your code</a:t>
+            </a:r>
+          </a:p>
+          <a:p>
+            <a:endParaRPr lang="en-US" dirty="0" smtClean="0"/>
+          </a:p>
+          <a:p>
+            <a:r>
+              <a:rPr lang="en-US" dirty="0" smtClean="0"/>
+              <a:t>So I lose my job at the height of the dot-com bust and I can't find another job in Colorado. So I move to Ohio where the rest of my family lives and go to work for a company that makes banking systems. Soon after my boss, who I hoped would be a mentor, checks himself into rehab for a drug addiction and shortly thereafter dies of a heart attack aided by the drugs. In the aftermath I become the senior engineer of the worst code base I have ever seen.</a:t>
+            </a:r>
+          </a:p>
+          <a:p>
+            <a:endParaRPr lang="en-US" dirty="0" smtClean="0"/>
+          </a:p>
+          <a:p>
+            <a:r>
+              <a:rPr lang="en-US" dirty="0" smtClean="0"/>
+              <a:t>Over the next five years this job provided my with many, many personal and professional lessons. Too many for now. But there is one important lesson I want to highlight.</a:t>
+            </a:r>
+          </a:p>
+          <a:p>
+            <a:endParaRPr lang="en-US" dirty="0" smtClean="0"/>
+          </a:p>
+          <a:p>
+            <a:r>
+              <a:rPr lang="en-US" dirty="0" smtClean="0"/>
+              <a:t>After a ridiculous amount of work the team and I were able to get things back on track and start delivering updates to customers. We pulled every trick in the book to make it happen. We sold stuff we didn't have, we delivered stuff we knew wasn't ready, and we finished features while onsite installing the software. We were in non-stop crisis mode and we took risks. A lot of risks. One day in Grenada the risks caught up to us.</a:t>
+            </a:r>
+          </a:p>
+          <a:p>
+            <a:endParaRPr lang="en-US" dirty="0" smtClean="0"/>
+          </a:p>
+          <a:p>
+            <a:r>
+              <a:rPr lang="en-US" dirty="0" smtClean="0"/>
+              <a:t>Everything about this particular delivery was bad from the beginning. Our customer had been bought by another company that preferred a competing product. There were insane political tensions at the bank. We were integrating with software from two companies we had never worked with and we had done woefully little testing. Pulling this off would have taken a miracle and we were all out. We couldn't get things to work and we had to back out and revert the system on our last day on the island. This was--by far--the lowest point in my career. The only reason my partner and I didn't get blind drunk that last night on the island is that we had an early flight and didn't want to miss it.</a:t>
+            </a:r>
+          </a:p>
+          <a:p>
+            <a:endParaRPr lang="en-US" dirty="0" smtClean="0"/>
+          </a:p>
+          <a:p>
+            <a:r>
+              <a:rPr lang="en-US" dirty="0" smtClean="0"/>
+              <a:t>I never, ever, wanted to deliver work that awful.</a:t>
             </a:r>
           </a:p>
           <a:p>
@@ -710,31 +721,37 @@
           <a:p>
             <a:r>
               <a:rPr lang="en-US" dirty="0" smtClean="0"/>
-              <a:t>* Being human means making mistakes</a:t>
-            </a:r>
-          </a:p>
-          <a:p>
-            <a:r>
-              <a:rPr lang="en-US" dirty="0" smtClean="0"/>
-              <a:t>* Mistakes naturally lead to regret</a:t>
-            </a:r>
-          </a:p>
-          <a:p>
-            <a:r>
-              <a:rPr lang="en-US" dirty="0" smtClean="0"/>
-              <a:t>* But you need to learn from your mistakes and grow from them</a:t>
-            </a:r>
-          </a:p>
-          <a:p>
-            <a:r>
-              <a:rPr lang="en-US" dirty="0" smtClean="0"/>
-              <a:t>* Don't carry your regret with you forever</a:t>
-            </a:r>
-          </a:p>
-          <a:p>
-            <a:r>
-              <a:rPr lang="en-US" dirty="0" smtClean="0"/>
-              <a:t>* It will eat you up from the inside if you do</a:t>
+              <a:t>* You are *not* your code</a:t>
+            </a:r>
+          </a:p>
+          <a:p>
+            <a:r>
+              <a:rPr lang="en-US" dirty="0" smtClean="0"/>
+              <a:t>* We programmers tend to take great pride in our work</a:t>
+            </a:r>
+          </a:p>
+          <a:p>
+            <a:r>
+              <a:rPr lang="en-US" dirty="0" smtClean="0"/>
+              <a:t>* We tend to invest ourselves deeply in our work</a:t>
+            </a:r>
+          </a:p>
+          <a:p>
+            <a:r>
+              <a:rPr lang="en-US" dirty="0" smtClean="0"/>
+              <a:t>* Unfortunately we often become so invested in our work we stop seeing where the work ends and we begin</a:t>
+            </a:r>
+          </a:p>
+          <a:p>
+            <a:r>
+              <a:rPr lang="en-US" dirty="0" smtClean="0"/>
+              <a:t>* Your worth as a human being is far greater than the sum of your work</a:t>
+            </a:r>
+          </a:p>
+          <a:p>
+            <a:r>
+              <a:rPr lang="en-US" dirty="0" smtClean="0"/>
+              <a:t>* Especially when you are in an environment where you don't have the opportunity to do your best work</a:t>
             </a:r>
           </a:p>
           <a:p>
@@ -768,7 +785,7 @@
     </p:spTree>
     <p:extLst>
       <p:ext uri="{BB962C8B-B14F-4D97-AF65-F5344CB8AC3E}">
-        <p14:creationId xmlns:p14="http://schemas.microsoft.com/office/powerpoint/2010/main" val="1516497296"/>
+        <p14:creationId xmlns:p14="http://schemas.microsoft.com/office/powerpoint/2010/main" val="85580301"/>
       </p:ext>
     </p:extLst>
   </p:cSld>
@@ -824,25 +841,25 @@
           <a:p>
             <a:r>
               <a:rPr lang="en-US" dirty="0" smtClean="0"/>
-              <a:t>## No one wants to do bad work</a:t>
-            </a:r>
-          </a:p>
-          <a:p>
-            <a:endParaRPr lang="en-US" dirty="0" smtClean="0"/>
-          </a:p>
-          <a:p>
-            <a:r>
-              <a:rPr lang="en-US" dirty="0" smtClean="0"/>
-              <a:t>So I'm back to work as the manager of the development team and one of my employees isn't meeting expectations. She was hired as an HTML author (that was a real job back then) but she really wanted to be a programmer. I hired her knowing that was her goal but she took the job knowing she didn't yet have the skills. We both knew she wasn't living up to her potential and we both knew why. Bus as the boss I had to make a decision. So I used her next performance review to let her make that decision.</a:t>
-            </a:r>
-          </a:p>
-          <a:p>
-            <a:endParaRPr lang="en-US" dirty="0" smtClean="0"/>
-          </a:p>
-          <a:p>
-            <a:r>
-              <a:rPr lang="en-US" dirty="0" smtClean="0"/>
-              <a:t>I offered her two choices. I put two job "offers" in front of her. One was for "Sr. HTML Author" and the other was for "Jr. Programmer". Both had the same salary (the same thing she was currently making). One job clearly had *no* programming responsibilities. The other came with a 6-month probation period in which I could fire her without question if she didn't meet several expectations explicitly detailed in the offer. One offer entailed risk and the other didn't. I asked he to come back tomorrow with a signature on one and to throw the other away.</a:t>
+              <a:t>## Your job is not your life</a:t>
+            </a:r>
+          </a:p>
+          <a:p>
+            <a:endParaRPr lang="en-US" dirty="0" smtClean="0"/>
+          </a:p>
+          <a:p>
+            <a:r>
+              <a:rPr lang="en-US" dirty="0" smtClean="0"/>
+              <a:t>At the time that I was struggling with these work problems I was also a newlywed. And I was teaching part-time at two universities. I was burned out, overworked, surly, and generally not a pleasant person. For the first time in my life I had a *true* personal life. And it was in danger before it really had a chance to form.</a:t>
+            </a:r>
+          </a:p>
+          <a:p>
+            <a:endParaRPr lang="en-US" dirty="0" smtClean="0"/>
+          </a:p>
+          <a:p>
+            <a:r>
+              <a:rPr lang="en-US" dirty="0" smtClean="0"/>
+              <a:t>So I quit my job.</a:t>
             </a:r>
           </a:p>
           <a:p>
@@ -868,31 +885,25 @@
           <a:p>
             <a:r>
               <a:rPr lang="en-US" dirty="0" smtClean="0"/>
-              <a:t>* When someone isn't getting the job done there is always a reason</a:t>
-            </a:r>
-          </a:p>
-          <a:p>
-            <a:r>
-              <a:rPr lang="en-US" dirty="0" smtClean="0"/>
-              <a:t>* Generally it isn't that the person is incapable of doing the job (thought occasionally it is)</a:t>
-            </a:r>
-          </a:p>
-          <a:p>
-            <a:r>
-              <a:rPr lang="en-US" dirty="0" smtClean="0"/>
-              <a:t>* People generally want to do good work</a:t>
-            </a:r>
-          </a:p>
-          <a:p>
-            <a:r>
-              <a:rPr lang="en-US" dirty="0" smtClean="0"/>
-              <a:t>* The problem is never as simple as "performance"</a:t>
-            </a:r>
-          </a:p>
-          <a:p>
-            <a:r>
-              <a:rPr lang="en-US" dirty="0" smtClean="0"/>
-              <a:t>* Find the root of the problem and solve it</a:t>
+              <a:t>* It's OK to love your work</a:t>
+            </a:r>
+          </a:p>
+          <a:p>
+            <a:r>
+              <a:rPr lang="en-US" dirty="0" smtClean="0"/>
+              <a:t>* In fact, we should all strive to find work we love</a:t>
+            </a:r>
+          </a:p>
+          <a:p>
+            <a:r>
+              <a:rPr lang="en-US" dirty="0" smtClean="0"/>
+              <a:t>* But love of work is no substitute for real love</a:t>
+            </a:r>
+          </a:p>
+          <a:p>
+            <a:r>
+              <a:rPr lang="en-US" dirty="0" smtClean="0"/>
+              <a:t>* Learn the difference</a:t>
             </a:r>
           </a:p>
           <a:p>
@@ -926,7 +937,7 @@
     </p:spTree>
     <p:extLst>
       <p:ext uri="{BB962C8B-B14F-4D97-AF65-F5344CB8AC3E}">
-        <p14:creationId xmlns:p14="http://schemas.microsoft.com/office/powerpoint/2010/main" val="4251400171"/>
+        <p14:creationId xmlns:p14="http://schemas.microsoft.com/office/powerpoint/2010/main" val="2182572907"/>
       </p:ext>
     </p:extLst>
   </p:cSld>
@@ -982,42 +993,32 @@
           <a:p>
             <a:r>
               <a:rPr lang="en-US" dirty="0" smtClean="0"/>
-              <a:t>## Recognize when it's time to go</a:t>
-            </a:r>
-          </a:p>
-          <a:p>
-            <a:endParaRPr lang="en-US" dirty="0" smtClean="0"/>
-          </a:p>
-          <a:p>
-            <a:r>
-              <a:rPr lang="en-US" dirty="0" smtClean="0"/>
-              <a:t>And then the dot-com bubble burst. Everything cam crashing down. You never realize just how dysfunctional a company is until things start to go bad. Turns out I was working for a very, very dysfunctional company. And things go bad.</a:t>
-            </a:r>
-          </a:p>
-          <a:p>
-            <a:endParaRPr lang="en-US" dirty="0" smtClean="0"/>
-          </a:p>
-          <a:p>
-            <a:r>
-              <a:rPr lang="en-US" dirty="0" smtClean="0"/>
-              <a:t>As the webmaster I was the boss </a:t>
-            </a:r>
-            <a:r>
-              <a:rPr lang="en-US" dirty="0" err="1" smtClean="0"/>
-              <a:t>fo</a:t>
-            </a:r>
-            <a:r>
-              <a:rPr lang="en-US" dirty="0" smtClean="0"/>
-              <a:t> half the company. I reported directly to one owner. Everyone else at the company reported (directly or indirectly) to the other owner. The two owners started *really* disliking each other. Given my role I found myself in the middle of a lot of controversy. Admittedly, my personal performance wasn't the best at this time, either. I'm human, too, and the dysfunction affected me just like everyone else. So I decided to quit…</a:t>
-            </a:r>
-          </a:p>
-          <a:p>
-            <a:endParaRPr lang="en-US" dirty="0" smtClean="0"/>
-          </a:p>
-          <a:p>
-            <a:r>
-              <a:rPr lang="en-US" dirty="0" smtClean="0"/>
-              <a:t>And got talked out of it. My boss had been one of my instructors while I was pursuing my undergrad. I considered him a friend. As my "friend" he talked me into staying. Staying was a mistake. I should have left.</a:t>
+              <a:t>## </a:t>
+            </a:r>
+            <a:r>
+              <a:rPr lang="en-US" dirty="0" smtClean="0"/>
+              <a:t>Good</a:t>
+            </a:r>
+            <a:r>
+              <a:rPr lang="en-US" baseline="0" dirty="0" smtClean="0"/>
+              <a:t> t</a:t>
+            </a:r>
+            <a:r>
+              <a:rPr lang="en-US" dirty="0" smtClean="0"/>
+              <a:t>eams </a:t>
+            </a:r>
+            <a:r>
+              <a:rPr lang="en-US" dirty="0" smtClean="0"/>
+              <a:t>stand together</a:t>
+            </a:r>
+          </a:p>
+          <a:p>
+            <a:endParaRPr lang="en-US" dirty="0" smtClean="0"/>
+          </a:p>
+          <a:p>
+            <a:r>
+              <a:rPr lang="en-US" dirty="0" smtClean="0"/>
+              <a:t>A few years later I'm working for a public broadcaster. One of the best companies I ever worked for. We were approaching our annual televised auction. My first. We pulled the code and databases from source control and discovered things were missing. The contractor who originally did the work hadn't put the database into source control and never created scripts to reproduce it. At one point we had a functioning auction system but we had done a ton of server work in the past year: buying new hardware, moving to virtual machines, decommissioning old servers, migrating servers, etc. Somewhere along the way we lost important stuff. Eventually we bit the bullet and told our VP and the VP in charge of the auction.</a:t>
             </a:r>
           </a:p>
           <a:p>
@@ -1043,25 +1044,25 @@
           <a:p>
             <a:r>
               <a:rPr lang="en-US" dirty="0" smtClean="0"/>
-              <a:t>* The unknown is scary</a:t>
-            </a:r>
-          </a:p>
-          <a:p>
-            <a:r>
-              <a:rPr lang="en-US" dirty="0" smtClean="0"/>
-              <a:t>* Sometimes it seems easier to stick with "the devil you know"</a:t>
-            </a:r>
-          </a:p>
-          <a:p>
-            <a:r>
-              <a:rPr lang="en-US" dirty="0" smtClean="0"/>
-              <a:t>* Often a bad situation that we've learned how to live with seems less bad than the unknown that we'll face if we leave</a:t>
-            </a:r>
-          </a:p>
-          <a:p>
-            <a:r>
-              <a:rPr lang="en-US" dirty="0" smtClean="0"/>
-              <a:t>* Usually we're completely wrong</a:t>
+              <a:t>* We never played the blame game</a:t>
+            </a:r>
+          </a:p>
+          <a:p>
+            <a:r>
+              <a:rPr lang="en-US" dirty="0" smtClean="0"/>
+              <a:t>* We never pointed fingers</a:t>
+            </a:r>
+          </a:p>
+          <a:p>
+            <a:r>
+              <a:rPr lang="en-US" dirty="0" smtClean="0"/>
+              <a:t>* We never said "he" or "she" or "I"</a:t>
+            </a:r>
+          </a:p>
+          <a:p>
+            <a:r>
+              <a:rPr lang="en-US" dirty="0" smtClean="0"/>
+              <a:t>* We went together, stood together, and faced the consequences together</a:t>
             </a:r>
           </a:p>
           <a:p>
@@ -1095,7 +1096,7 @@
     </p:spTree>
     <p:extLst>
       <p:ext uri="{BB962C8B-B14F-4D97-AF65-F5344CB8AC3E}">
-        <p14:creationId xmlns:p14="http://schemas.microsoft.com/office/powerpoint/2010/main" val="3126269369"/>
+        <p14:creationId xmlns:p14="http://schemas.microsoft.com/office/powerpoint/2010/main" val="430124737"/>
       </p:ext>
     </p:extLst>
   </p:cSld>
@@ -1151,16 +1152,16 @@
           <a:p>
             <a:r>
               <a:rPr lang="en-US" dirty="0" smtClean="0"/>
-              <a:t>## Business isn't personal</a:t>
-            </a:r>
-          </a:p>
-          <a:p>
-            <a:endParaRPr lang="en-US" dirty="0" smtClean="0"/>
-          </a:p>
-          <a:p>
-            <a:r>
-              <a:rPr lang="en-US" dirty="0" smtClean="0"/>
-              <a:t>Six months later I was fired from the job I had tried to quit. My boss had asked me to stay because he and I had a history together. I truly believe he valued that history and I truly believe he wanted things to work out. But it wasn't going to. I was a bad fit for the company at the time. Despite all the work I did helping build the company from scratch my presence was disruptive. As profits started to shrink the ROI on my presence was getting lower. Keeping me was simply a bad business decision.</a:t>
+              <a:t>## Offer solutions, not excuses</a:t>
+            </a:r>
+          </a:p>
+          <a:p>
+            <a:endParaRPr lang="en-US" dirty="0" smtClean="0"/>
+          </a:p>
+          <a:p>
+            <a:r>
+              <a:rPr lang="en-US" dirty="0" smtClean="0"/>
+              <a:t>Given all the changes we had implemented the prior year it's amazing we didn't lose more stuff (I have a habit of taking jobs where I'm asked to clean up a mess made by my predecessor). But excuses don't solve anything. When performing retrospectives it's important to understand causes and reasons. But those are different than excuses. More importantly, triage requires action. When we went to the VPs to admit our mistake we came ready with an action plan for how we would fix things in time for the auction.</a:t>
             </a:r>
           </a:p>
           <a:p>
@@ -1186,19 +1187,31 @@
           <a:p>
             <a:r>
               <a:rPr lang="en-US" dirty="0" smtClean="0"/>
-              <a:t>* Some people are not a good fit for some jobs</a:t>
-            </a:r>
-          </a:p>
-          <a:p>
-            <a:r>
-              <a:rPr lang="en-US" dirty="0" smtClean="0"/>
-              <a:t>* Some jobs are not a good fit for some people</a:t>
-            </a:r>
-          </a:p>
-          <a:p>
-            <a:r>
-              <a:rPr lang="en-US" dirty="0" smtClean="0"/>
-              <a:t>* Recognizing this isn't personal</a:t>
+              <a:t>* We knew what needed done and promised to deliver something at least as good as what we lost</a:t>
+            </a:r>
+          </a:p>
+          <a:p>
+            <a:r>
+              <a:rPr lang="en-US" dirty="0" smtClean="0"/>
+              <a:t>* We looked at everything that needed done and everyone took part of the work</a:t>
+            </a:r>
+          </a:p>
+          <a:p>
+            <a:r>
+              <a:rPr lang="en-US" dirty="0" smtClean="0"/>
+              <a:t>* In some cases we even temporarily switched job responsibilities so the people with the right skills could focus on the critical tasks</a:t>
+            </a:r>
+          </a:p>
+          <a:p>
+            <a:r>
+              <a:rPr lang="en-US" dirty="0" smtClean="0"/>
+              <a:t>* We all agreed to put in extra time</a:t>
+            </a:r>
+          </a:p>
+          <a:p>
+            <a:r>
+              <a:rPr lang="en-US" dirty="0" smtClean="0"/>
+              <a:t>* Most importantly, we never gave the VPs a chance to ask "so what do we do now?"</a:t>
             </a:r>
           </a:p>
           <a:p>
@@ -1232,7 +1245,7 @@
     </p:spTree>
     <p:extLst>
       <p:ext uri="{BB962C8B-B14F-4D97-AF65-F5344CB8AC3E}">
-        <p14:creationId xmlns:p14="http://schemas.microsoft.com/office/powerpoint/2010/main" val="2141317944"/>
+        <p14:creationId xmlns:p14="http://schemas.microsoft.com/office/powerpoint/2010/main" val="334914484"/>
       </p:ext>
     </p:extLst>
   </p:cSld>
@@ -1288,51 +1301,25 @@
           <a:p>
             <a:r>
               <a:rPr lang="en-US" dirty="0" smtClean="0"/>
-              <a:t>## But how you conduct business is</a:t>
-            </a:r>
-          </a:p>
-          <a:p>
-            <a:endParaRPr lang="en-US" dirty="0" smtClean="0"/>
-          </a:p>
-          <a:p>
-            <a:r>
-              <a:rPr lang="en-US" dirty="0" smtClean="0"/>
-              <a:t>I was working from home at the time I was fired. A couple of weird things that happened in the previous months that made me paranoid. So I bluntly </a:t>
-            </a:r>
-            <a:r>
-              <a:rPr lang="en-US" dirty="0" err="1" smtClean="0"/>
-              <a:t>aksed</a:t>
-            </a:r>
-            <a:r>
-              <a:rPr lang="en-US" dirty="0" smtClean="0"/>
-              <a:t> my boss one day "Are you planning to get rid of me?" He denied it in every possible way. There was no way he would ever get rid of me. A month later he fired me.</a:t>
-            </a:r>
-          </a:p>
-          <a:p>
-            <a:endParaRPr lang="en-US" dirty="0" smtClean="0"/>
-          </a:p>
-          <a:p>
-            <a:r>
-              <a:rPr lang="en-US" dirty="0" smtClean="0"/>
-              <a:t>By email.</a:t>
-            </a:r>
-          </a:p>
-          <a:p>
-            <a:endParaRPr lang="en-US" dirty="0" smtClean="0"/>
-          </a:p>
-          <a:p>
-            <a:r>
-              <a:rPr lang="en-US" dirty="0" smtClean="0"/>
-              <a:t>He repaid my friendship and my loyalty by sending me an email telling me not to come in to work that day because I no longer had a job. He followed up by asking if we could meet somewhere outside the office so that I could return the company's computer and other assets.</a:t>
-            </a:r>
-          </a:p>
-          <a:p>
-            <a:endParaRPr lang="en-US" dirty="0" smtClean="0"/>
-          </a:p>
-          <a:p>
-            <a:r>
-              <a:rPr lang="en-US" dirty="0" smtClean="0"/>
-              <a:t>I never faulted him for the decision to get rid of me, but I forever lost my respect for him over how he handled it.</a:t>
+              <a:t>## Failure are also opportunities</a:t>
+            </a:r>
+          </a:p>
+          <a:p>
+            <a:endParaRPr lang="en-US" dirty="0" smtClean="0"/>
+          </a:p>
+          <a:p>
+            <a:r>
+              <a:rPr lang="en-US" dirty="0" smtClean="0"/>
+              <a:t>Turns out that many users were unhappy with the previous system. It was an online auction system but we weren't running an online auction. We were running a televised auction with online bidding. These are two very different things.</a:t>
+            </a:r>
+          </a:p>
+          <a:p>
+            <a:endParaRPr lang="en-US" dirty="0" smtClean="0"/>
+          </a:p>
+          <a:p>
+            <a:r>
+              <a:rPr lang="en-US" dirty="0" smtClean="0"/>
+              <a:t>We had to start from scratch so we used the opportunity to learn the pain points of the old system and build something better suited to the problem.</a:t>
             </a:r>
           </a:p>
           <a:p>
@@ -1358,19 +1345,19 @@
           <a:p>
             <a:r>
               <a:rPr lang="en-US" dirty="0" smtClean="0"/>
-              <a:t>* Business is not personal but you conduct business is often intensely personal</a:t>
-            </a:r>
-          </a:p>
-          <a:p>
-            <a:r>
-              <a:rPr lang="en-US" dirty="0" smtClean="0"/>
-              <a:t>* Never forget that employees aren't "assets" or "resources"</a:t>
-            </a:r>
-          </a:p>
-          <a:p>
-            <a:r>
-              <a:rPr lang="en-US" dirty="0" smtClean="0"/>
-              <a:t>* Employees are human beings</a:t>
+              <a:t>* Mistakes are often opportunities to reevaluate what you were doing in the first place</a:t>
+            </a:r>
+          </a:p>
+          <a:p>
+            <a:r>
+              <a:rPr lang="en-US" dirty="0" smtClean="0"/>
+              <a:t>* When something goes bad, make it better</a:t>
+            </a:r>
+          </a:p>
+          <a:p>
+            <a:r>
+              <a:rPr lang="en-US" dirty="0" smtClean="0"/>
+              <a:t>* Always leave things better than you found them</a:t>
             </a:r>
           </a:p>
           <a:p>
@@ -1404,7 +1391,7 @@
     </p:spTree>
     <p:extLst>
       <p:ext uri="{BB962C8B-B14F-4D97-AF65-F5344CB8AC3E}">
-        <p14:creationId xmlns:p14="http://schemas.microsoft.com/office/powerpoint/2010/main" val="3178512774"/>
+        <p14:creationId xmlns:p14="http://schemas.microsoft.com/office/powerpoint/2010/main" val="851194640"/>
       </p:ext>
     </p:extLst>
   </p:cSld>
@@ -1460,52 +1447,47 @@
           <a:p>
             <a:r>
               <a:rPr lang="en-US" dirty="0" smtClean="0"/>
-              <a:t>## You are *not* your code</a:t>
-            </a:r>
-          </a:p>
-          <a:p>
-            <a:endParaRPr lang="en-US" dirty="0" smtClean="0"/>
-          </a:p>
-          <a:p>
-            <a:r>
-              <a:rPr lang="en-US" dirty="0" smtClean="0"/>
-              <a:t>So I lose my job at the height of the dot-com bust and I can't find another job in Colorado. So I move to Ohio where the rest of my family lives and go to work for a company that makes banking systems. Soon after my boss, who I hoped would be a mentor, checks himself into rehab for a drug addiction and shortly thereafter dies of a heart attack aided by the drugs. In the aftermath I become the senior engineer of the worst code base I have ever seen.</a:t>
-            </a:r>
-          </a:p>
-          <a:p>
-            <a:endParaRPr lang="en-US" dirty="0" smtClean="0"/>
-          </a:p>
-          <a:p>
-            <a:r>
-              <a:rPr lang="en-US" dirty="0" smtClean="0"/>
-              <a:t>Over the next five years this job provided my with many, many personal and professional lessons. Too many for now. But there is one important lesson I want to highlight.</a:t>
-            </a:r>
-          </a:p>
-          <a:p>
-            <a:endParaRPr lang="en-US" dirty="0" smtClean="0"/>
-          </a:p>
-          <a:p>
-            <a:r>
-              <a:rPr lang="en-US" dirty="0" smtClean="0"/>
-              <a:t>After a ridiculous amount of work the team and I were able to get things back on track and start delivering updates to customers. We pulled every trick in the book to make it happen. We sold stuff we didn't have, we delivered stuff we knew wasn't ready, and we finished features while onsite installing the software. We were in non-stop crisis mode and we took risks. A lot of risks. One day in Grenada the risks caught up to us.</a:t>
-            </a:r>
-          </a:p>
-          <a:p>
-            <a:endParaRPr lang="en-US" dirty="0" smtClean="0"/>
-          </a:p>
-          <a:p>
-            <a:r>
-              <a:rPr lang="en-US" dirty="0" smtClean="0"/>
-              <a:t>Everything about this particular delivery was bad from the beginning. Our customer had been bought by another company that preferred a competing product. There were insane political tensions at the bank. We were integrating with software from two companies we had never worked with and we had done woefully little testing. Pulling this off would have taken a miracle and we were all out. We couldn't get things to work and we had to back out and revert the system on our last day on the island. This was--by far--the lowest point in my career. The only reason my partner and I didn't get blind drunk that last night on the island is that we had an early flight and didn't want to miss it.</a:t>
-            </a:r>
-          </a:p>
-          <a:p>
-            <a:endParaRPr lang="en-US" dirty="0" smtClean="0"/>
-          </a:p>
-          <a:p>
-            <a:r>
-              <a:rPr lang="en-US" dirty="0" smtClean="0"/>
-              <a:t>I never, ever, wanted to deliver work that awful.</a:t>
+              <a:t>## My team gets credit, I get blame</a:t>
+            </a:r>
+          </a:p>
+          <a:p>
+            <a:endParaRPr lang="en-US" dirty="0" smtClean="0"/>
+          </a:p>
+          <a:p>
+            <a:r>
+              <a:rPr lang="en-US" dirty="0" smtClean="0"/>
+              <a:t>In my next job I found myself taking over a failed project (again). My predecessor was a good person but a bad fit in the role. So </a:t>
+            </a:r>
+            <a:r>
+              <a:rPr lang="en-US" dirty="0" smtClean="0"/>
+              <a:t>we get the project turned around and we start cranking out code. We made some very pragmatic decisions but the funder was happy and stopped threatening to pull the funds. Then one day one of the members of the business team--someone I workers with at my previous job and someone with whom I shared tremendous mutual respect--got upset over a feature.</a:t>
+            </a:r>
+          </a:p>
+          <a:p>
+            <a:endParaRPr lang="en-US" dirty="0" smtClean="0"/>
+          </a:p>
+          <a:p>
+            <a:r>
+              <a:rPr lang="en-US" dirty="0" smtClean="0"/>
+              <a:t>So we're sitting in the office and he is uncharacteristically angry. Fuming mad actually. I thought the actual bug was very minor but it was important to him so it was important to me. He kept asking me which programmer worked on the feature and I kept refusing to tell him.</a:t>
+            </a:r>
+          </a:p>
+          <a:p>
+            <a:endParaRPr lang="en-US" dirty="0" smtClean="0"/>
+          </a:p>
+          <a:p>
+            <a:r>
+              <a:rPr lang="en-US" dirty="0" smtClean="0"/>
+              <a:t>"You're not going to tell me who this was, are you?" he asked. "No matter how hard I push."</a:t>
+            </a:r>
+          </a:p>
+          <a:p>
+            <a:endParaRPr lang="en-US" dirty="0" smtClean="0"/>
+          </a:p>
+          <a:p>
+            <a:r>
+              <a:rPr lang="en-US" dirty="0" smtClean="0"/>
+              <a:t>"No" I said, "I am not." I continued. "I understand you are unhappy and I am going to do everything I can to make this right, but I won't throw one of my team under the bus. I am the boss. I am responsible. I set the expectations for my team, I set the standards for my team, I create their process and I assign them their work. We failed you, which means I failed them. You and I will talk as long as necessary to figure out how we can improve the process, make this right, and prevent it in the future. But I will not make this a finger pointing exercise. Point the finger at me, get your frustration out of your system, then we'll get to work."</a:t>
             </a:r>
           </a:p>
           <a:p>
@@ -1531,37 +1513,49 @@
           <a:p>
             <a:r>
               <a:rPr lang="en-US" dirty="0" smtClean="0"/>
-              <a:t>* You are *not* your code</a:t>
-            </a:r>
-          </a:p>
-          <a:p>
-            <a:r>
-              <a:rPr lang="en-US" dirty="0" smtClean="0"/>
-              <a:t>* We programmers tend to take great pride in our work</a:t>
-            </a:r>
-          </a:p>
-          <a:p>
-            <a:r>
-              <a:rPr lang="en-US" dirty="0" smtClean="0"/>
-              <a:t>* We tend to invest ourselves deeply in our work</a:t>
-            </a:r>
-          </a:p>
-          <a:p>
-            <a:r>
-              <a:rPr lang="en-US" dirty="0" smtClean="0"/>
-              <a:t>* Unfortunately we often become so invested in our work we stop seeing where the work ends and we begin</a:t>
-            </a:r>
-          </a:p>
-          <a:p>
-            <a:r>
-              <a:rPr lang="en-US" dirty="0" smtClean="0"/>
-              <a:t>* Your worth as a human being is far greater than the sum of your work</a:t>
-            </a:r>
-          </a:p>
-          <a:p>
-            <a:r>
-              <a:rPr lang="en-US" dirty="0" smtClean="0"/>
-              <a:t>* Especially when you are in an environment where you don't have the opportunity to do your best work</a:t>
+              <a:t>* When a team performs will the leader will get credit</a:t>
+            </a:r>
+          </a:p>
+          <a:p>
+            <a:r>
+              <a:rPr lang="en-US" dirty="0" smtClean="0"/>
+              <a:t>* There is never a reason for a leader to steal credit from an individual team member</a:t>
+            </a:r>
+          </a:p>
+          <a:p>
+            <a:r>
+              <a:rPr lang="en-US" dirty="0" smtClean="0"/>
+              <a:t>* Let everyone know the good work each team member is doing and you'll still look good as the leader</a:t>
+            </a:r>
+          </a:p>
+          <a:p>
+            <a:r>
+              <a:rPr lang="en-US" dirty="0" smtClean="0"/>
+              <a:t>* But when things go bad, shield the team</a:t>
+            </a:r>
+          </a:p>
+          <a:p>
+            <a:r>
+              <a:rPr lang="en-US" dirty="0" smtClean="0"/>
+              <a:t>* Take responsibility for your role as leader</a:t>
+            </a:r>
+          </a:p>
+          <a:p>
+            <a:r>
+              <a:rPr lang="en-US" dirty="0" smtClean="0"/>
+              <a:t>* If an individual team member needs coaching do it in private</a:t>
+            </a:r>
+          </a:p>
+          <a:p>
+            <a:r>
+              <a:rPr lang="en-US" dirty="0" smtClean="0"/>
+              <a:t>* People feel bad when their team makes a mistake</a:t>
+            </a:r>
+          </a:p>
+          <a:p>
+            <a:r>
+              <a:rPr lang="en-US" dirty="0" smtClean="0"/>
+              <a:t>* Never compound it by dividing the team</a:t>
             </a:r>
           </a:p>
           <a:p>
@@ -1595,7 +1589,7 @@
     </p:spTree>
     <p:extLst>
       <p:ext uri="{BB962C8B-B14F-4D97-AF65-F5344CB8AC3E}">
-        <p14:creationId xmlns:p14="http://schemas.microsoft.com/office/powerpoint/2010/main" val="85580301"/>
+        <p14:creationId xmlns:p14="http://schemas.microsoft.com/office/powerpoint/2010/main" val="1843141395"/>
       </p:ext>
     </p:extLst>
   </p:cSld>
@@ -1651,25 +1645,42 @@
           <a:p>
             <a:r>
               <a:rPr lang="en-US" dirty="0" smtClean="0"/>
-              <a:t>## Your job is not your life</a:t>
-            </a:r>
-          </a:p>
-          <a:p>
-            <a:endParaRPr lang="en-US" dirty="0" smtClean="0"/>
-          </a:p>
-          <a:p>
-            <a:r>
-              <a:rPr lang="en-US" dirty="0" smtClean="0"/>
-              <a:t>At the time that I was struggling with these work problems I was also a newlywed. And I was teaching part-time at two universities. I was burned out, overworked, surly, and generally not a pleasant person. For the first time in my life I had a *true* personal life. And it was in danger before it really had a chance to form.</a:t>
-            </a:r>
-          </a:p>
-          <a:p>
-            <a:endParaRPr lang="en-US" dirty="0" smtClean="0"/>
-          </a:p>
-          <a:p>
-            <a:r>
-              <a:rPr lang="en-US" dirty="0" smtClean="0"/>
-              <a:t>So I quit my job.</a:t>
+              <a:t>## Be true to yourself</a:t>
+            </a:r>
+          </a:p>
+          <a:p>
+            <a:endParaRPr lang="en-US" dirty="0" smtClean="0"/>
+          </a:p>
+          <a:p>
+            <a:r>
+              <a:rPr lang="en-US" dirty="0" smtClean="0"/>
+              <a:t>I ended up leaving that job to go back to programming. I've spent at least as much time over my career being the boss as I have being a coder. If the people I've worked with are to be believed, I'm pretty good at the whole boss thing. When I decided to go back to a non-boss role several people who knew me were very surprised. "But you're so good at it!" is the usual refrain.</a:t>
+            </a:r>
+          </a:p>
+          <a:p>
+            <a:endParaRPr lang="en-US" dirty="0" smtClean="0"/>
+          </a:p>
+          <a:p>
+            <a:r>
+              <a:rPr lang="en-US" dirty="0" smtClean="0"/>
+              <a:t>Truth is, there is nothing I ever do as a manager that makes me as happy as writing code. The only good days are the days where I spend most of my time in Vim, writing code.</a:t>
+            </a:r>
+          </a:p>
+          <a:p>
+            <a:endParaRPr lang="en-US" dirty="0" smtClean="0"/>
+          </a:p>
+          <a:p>
+            <a:r>
+              <a:rPr lang="en-US" dirty="0" smtClean="0"/>
+              <a:t>One of the guys on my team now worked with me on another project a few years ago. When we met up again to talk about this gig he noticed I was dressed nicer. ""Did you go out and but a bunch of nice clothes?" he asked. "Just the opposite" I explained. I had to buy a bunch of T-shirts when I worked with you last. When I started working with a bunch of young, hipster </a:t>
+            </a:r>
+            <a:r>
+              <a:rPr lang="en-US" dirty="0" err="1" smtClean="0"/>
+              <a:t>Rubyists</a:t>
+            </a:r>
+            <a:r>
+              <a:rPr lang="en-US" dirty="0" smtClean="0"/>
+              <a:t> I tried to fit in. Truth is I am neither young nor a hipster and I finally realized it was time I stopped pretending I was either.</a:t>
             </a:r>
           </a:p>
           <a:p>
@@ -1695,25 +1706,31 @@
           <a:p>
             <a:r>
               <a:rPr lang="en-US" dirty="0" smtClean="0"/>
-              <a:t>* It's OK to love your work</a:t>
-            </a:r>
-          </a:p>
-          <a:p>
-            <a:r>
-              <a:rPr lang="en-US" dirty="0" smtClean="0"/>
-              <a:t>* In fact, we should all strive to find work we love</a:t>
-            </a:r>
-          </a:p>
-          <a:p>
-            <a:r>
-              <a:rPr lang="en-US" dirty="0" smtClean="0"/>
-              <a:t>* But love of work is no substitute for real love</a:t>
-            </a:r>
-          </a:p>
-          <a:p>
-            <a:r>
-              <a:rPr lang="en-US" dirty="0" smtClean="0"/>
-              <a:t>* Learn the difference</a:t>
+              <a:t>* You are who you are</a:t>
+            </a:r>
+          </a:p>
+          <a:p>
+            <a:r>
+              <a:rPr lang="en-US" dirty="0" smtClean="0"/>
+              <a:t>* Embrace that, don't deny that</a:t>
+            </a:r>
+          </a:p>
+          <a:p>
+            <a:r>
+              <a:rPr lang="en-US" dirty="0" smtClean="0"/>
+              <a:t>* Being good at something isn't the same thing as being happy doing it</a:t>
+            </a:r>
+          </a:p>
+          <a:p>
+            <a:r>
+              <a:rPr lang="en-US" dirty="0" smtClean="0"/>
+              <a:t>* You will always be more happy and more genuine if you embrace the real you</a:t>
+            </a:r>
+          </a:p>
+          <a:p>
+            <a:r>
+              <a:rPr lang="en-US" dirty="0" smtClean="0"/>
+              <a:t>* Screw everyone else if they don't like it</a:t>
             </a:r>
           </a:p>
           <a:p>
@@ -1747,7 +1764,7 @@
     </p:spTree>
     <p:extLst>
       <p:ext uri="{BB962C8B-B14F-4D97-AF65-F5344CB8AC3E}">
-        <p14:creationId xmlns:p14="http://schemas.microsoft.com/office/powerpoint/2010/main" val="2182572907"/>
+        <p14:creationId xmlns:p14="http://schemas.microsoft.com/office/powerpoint/2010/main" val="374399553"/>
       </p:ext>
     </p:extLst>
   </p:cSld>
@@ -1803,16 +1820,65 @@
           <a:p>
             <a:r>
               <a:rPr lang="en-US" dirty="0" smtClean="0"/>
-              <a:t>## Teams stand together</a:t>
-            </a:r>
-          </a:p>
-          <a:p>
-            <a:endParaRPr lang="en-US" dirty="0" smtClean="0"/>
-          </a:p>
-          <a:p>
-            <a:r>
-              <a:rPr lang="en-US" dirty="0" smtClean="0"/>
-              <a:t>A few years later I'm working for a public broadcaster. One of the best companies I ever worked for. We were approaching our annual televised auction. My first. We pulled the code and databases from source control and discovered things were missing. The contractor who originally did the work hadn't put the database into source control and never created scripts to reproduce it. At one point we had a functioning auction system but we had done a ton of server work in the past year: buying new hardware, moving to virtual machines, decommissioning old servers, migrating servers, etc. Somewhere along the way we lost important stuff. Eventually we bit the bullet and told our VP and the VP in charge of the auction.</a:t>
+              <a:t>## Take Risks</a:t>
+            </a:r>
+          </a:p>
+          <a:p>
+            <a:endParaRPr lang="en-US" dirty="0" smtClean="0"/>
+          </a:p>
+          <a:p>
+            <a:r>
+              <a:rPr lang="en-US" dirty="0" smtClean="0"/>
+              <a:t>So now I'm nearly 20 years into my career. I've been a student, a teacher, a boss, and a teammate. I'm very established in my area and have a pretty good (thought not spotless) reputation. I work for a great company doing interesting work with some of the best tech professionals I have ever met. By all accounts my career is good. But that's no excuse for resting on my laurels.</a:t>
+            </a:r>
+          </a:p>
+          <a:p>
+            <a:endParaRPr lang="en-US" dirty="0" smtClean="0"/>
+          </a:p>
+          <a:p>
+            <a:r>
+              <a:rPr lang="en-US" dirty="0" smtClean="0"/>
+              <a:t>Two years ago I had never spoken at a major conference nor had I contributed to open source. I'd had plenty of experience speaking publicly but it was mostly in the classroom and at user group meetings. Speaking in front of 100+ strangers at a conference is something I hadn't done. Similarly, I had been writing code for a very long time but I had never made it publicly accessible. But I'm proud of the work I do and I think others can benefit from what I've done. So I wanted to share. So on a lark I put some code on </a:t>
+            </a:r>
+            <a:r>
+              <a:rPr lang="en-US" dirty="0" err="1" smtClean="0"/>
+              <a:t>GitHub</a:t>
+            </a:r>
+            <a:r>
+              <a:rPr lang="en-US" dirty="0" smtClean="0"/>
+              <a:t> and I started submitting abstracts to various conferences. Today and I am the creator and maintainer of a couple of open source projects, including a gem that has five other active contributors from five other countries. I'm also a fairly regular conference speaker. I've spoken at Cascadia Ruby, </a:t>
+            </a:r>
+            <a:r>
+              <a:rPr lang="en-US" dirty="0" err="1" smtClean="0"/>
+              <a:t>CodeMash</a:t>
+            </a:r>
+            <a:r>
+              <a:rPr lang="en-US" dirty="0" smtClean="0"/>
+              <a:t>, Stir Trek, and </a:t>
+            </a:r>
+            <a:r>
+              <a:rPr lang="en-US" dirty="0" err="1" smtClean="0"/>
+              <a:t>RubyConf</a:t>
+            </a:r>
+            <a:r>
+              <a:rPr lang="en-US" dirty="0" smtClean="0"/>
+              <a:t> (the biggest Ruby conference in the United States). I've also given presentations at </a:t>
+            </a:r>
+            <a:r>
+              <a:rPr lang="en-US" dirty="0" err="1" smtClean="0"/>
+              <a:t>DevBootCamp</a:t>
+            </a:r>
+            <a:r>
+              <a:rPr lang="en-US" dirty="0" smtClean="0"/>
+              <a:t> Chicago, here at the Software Craftsman Guild in Akron, and I've taught at </a:t>
+            </a:r>
+            <a:r>
+              <a:rPr lang="en-US" dirty="0" err="1" smtClean="0"/>
+              <a:t>RailsBrigde</a:t>
+            </a:r>
+            <a:r>
+              <a:rPr lang="en-US" dirty="0" smtClean="0"/>
+              <a:t> Cleveland. And I still speak at various user groups including the Akron Code Club and Cleveland Ruby Brigade.</a:t>
             </a:r>
           </a:p>
           <a:p>
@@ -1838,29 +1904,33 @@
           <a:p>
             <a:r>
               <a:rPr lang="en-US" dirty="0" smtClean="0"/>
-              <a:t>* We never played the blame game</a:t>
-            </a:r>
-          </a:p>
-          <a:p>
-            <a:r>
-              <a:rPr lang="en-US" dirty="0" smtClean="0"/>
-              <a:t>* We never pointed fingers</a:t>
-            </a:r>
-          </a:p>
-          <a:p>
-            <a:r>
-              <a:rPr lang="en-US" dirty="0" smtClean="0"/>
-              <a:t>* We never said "he" or "she" or "I"</a:t>
-            </a:r>
-          </a:p>
-          <a:p>
-            <a:r>
-              <a:rPr lang="en-US" dirty="0" smtClean="0"/>
-              <a:t>* We went together, stood together, and faced the consequences together</a:t>
-            </a:r>
-          </a:p>
-          <a:p>
-            <a:endParaRPr lang="en-US" dirty="0"/>
+              <a:t>* There are always opportunities to do more</a:t>
+            </a:r>
+          </a:p>
+          <a:p>
+            <a:r>
+              <a:rPr lang="en-US" dirty="0" smtClean="0"/>
+              <a:t>* Never stop challenging yourself</a:t>
+            </a:r>
+          </a:p>
+          <a:p>
+            <a:r>
+              <a:rPr lang="en-US" dirty="0" smtClean="0"/>
+              <a:t>* Some risks won't pay off</a:t>
+            </a:r>
+          </a:p>
+          <a:p>
+            <a:r>
+              <a:rPr lang="en-US" dirty="0" smtClean="0"/>
+              <a:t>* But there are no rewards without risk</a:t>
+            </a:r>
+          </a:p>
+          <a:p>
+            <a:r>
+              <a:rPr lang="en-US" smtClean="0"/>
+              <a:t>* "If somebody offers you an amazing opportunity but you are not sure you can do it, say yes – then learn how to do it later!" ― Richard Branson</a:t>
+            </a:r>
+            <a:endParaRPr lang="en-US" dirty="0" smtClean="0"/>
           </a:p>
         </p:txBody>
       </p:sp>
@@ -1890,7 +1960,7 @@
     </p:spTree>
     <p:extLst>
       <p:ext uri="{BB962C8B-B14F-4D97-AF65-F5344CB8AC3E}">
-        <p14:creationId xmlns:p14="http://schemas.microsoft.com/office/powerpoint/2010/main" val="430124737"/>
+        <p14:creationId xmlns:p14="http://schemas.microsoft.com/office/powerpoint/2010/main" val="2175515360"/>
       </p:ext>
     </p:extLst>
   </p:cSld>
@@ -1946,16 +2016,80 @@
           <a:p>
             <a:r>
               <a:rPr lang="en-US" dirty="0" smtClean="0"/>
-              <a:t>## Offer solutions, not excuses</a:t>
-            </a:r>
-          </a:p>
-          <a:p>
-            <a:endParaRPr lang="en-US" dirty="0" smtClean="0"/>
-          </a:p>
-          <a:p>
-            <a:r>
-              <a:rPr lang="en-US" dirty="0" smtClean="0"/>
-              <a:t>Given all the changes we had implemented the prior year it's amazing we didn't lose more stuff (I have a habit of taking jobs where I'm asked to clean up a mess made by my predecessor). But excuses don't solve anything. When performing retrospectives it's important to understand causes and reasons. But those are different than excuses. More importantly, triage requires action. When we went to the VPs to admit our mistake we came ready with an action plan for how we would fix things in time for the auction.</a:t>
+              <a:t>## Sometimes the best idea isn't yours</a:t>
+            </a:r>
+          </a:p>
+          <a:p>
+            <a:endParaRPr lang="en-US" dirty="0" smtClean="0"/>
+          </a:p>
+          <a:p>
+            <a:r>
+              <a:rPr lang="en-US" dirty="0" smtClean="0"/>
+              <a:t>In all the hustle-and-bustle getting ready for </a:t>
+            </a:r>
+            <a:r>
+              <a:rPr lang="en-US" dirty="0" err="1" smtClean="0"/>
+              <a:t>CascadiaRuby</a:t>
+            </a:r>
+            <a:r>
+              <a:rPr lang="en-US" dirty="0" smtClean="0"/>
+              <a:t> and </a:t>
+            </a:r>
+            <a:r>
+              <a:rPr lang="en-US" dirty="0" err="1" smtClean="0"/>
+              <a:t>RubyConf</a:t>
+            </a:r>
+            <a:r>
+              <a:rPr lang="en-US" dirty="0" smtClean="0"/>
+              <a:t> I never got my </a:t>
+            </a:r>
+            <a:r>
+              <a:rPr lang="en-US" dirty="0" err="1" smtClean="0"/>
+              <a:t>DevBootCamp</a:t>
+            </a:r>
+            <a:r>
+              <a:rPr lang="en-US" dirty="0" smtClean="0"/>
+              <a:t> presentation where I wanted it. I had ambitious goals for the presentation. I pitched the idea to several people and they all liked it, but things just weren't coming together. A couple of days out from my speaking gig and I still didn't have a complete presentation and I was starting to get worried. But then I attended </a:t>
+            </a:r>
+            <a:r>
+              <a:rPr lang="en-US" dirty="0" err="1" smtClean="0"/>
+              <a:t>CascadiaRuby</a:t>
+            </a:r>
+            <a:endParaRPr lang="en-US" dirty="0" smtClean="0"/>
+          </a:p>
+          <a:p>
+            <a:endParaRPr lang="en-US" dirty="0" smtClean="0"/>
+          </a:p>
+          <a:p>
+            <a:r>
+              <a:rPr lang="en-US" dirty="0" smtClean="0"/>
+              <a:t>One of the presenters gave a very personal, very powerful, and very moving presentation about lessons he had learned over a career and a computer programmer. He was about my age and had several similar experiences. I related deeply and loved every second of his presentation.</a:t>
+            </a:r>
+          </a:p>
+          <a:p>
+            <a:endParaRPr lang="en-US" dirty="0" smtClean="0"/>
+          </a:p>
+          <a:p>
+            <a:r>
+              <a:rPr lang="en-US" dirty="0" smtClean="0"/>
+              <a:t>When I talked to him about it later he told me he had originally put the presentation together for a group of new programmers just starting out in their careers. A group very similar to the group I was going to be talking to a </a:t>
+            </a:r>
+            <a:r>
+              <a:rPr lang="en-US" dirty="0" err="1" smtClean="0"/>
+              <a:t>DevBootCamp</a:t>
+            </a:r>
+            <a:r>
+              <a:rPr lang="en-US" dirty="0" smtClean="0"/>
+              <a:t>.</a:t>
+            </a:r>
+          </a:p>
+          <a:p>
+            <a:endParaRPr lang="en-US" dirty="0" smtClean="0"/>
+          </a:p>
+          <a:p>
+            <a:r>
+              <a:rPr lang="en-US" dirty="0" smtClean="0"/>
+              <a:t>Honestly, his presentation idea was just much better than mine.</a:t>
             </a:r>
           </a:p>
           <a:p>
@@ -1981,31 +2115,55 @@
           <a:p>
             <a:r>
               <a:rPr lang="en-US" dirty="0" smtClean="0"/>
-              <a:t>* We knew what needed done and promised to deliver something at least as good as what we lost</a:t>
-            </a:r>
-          </a:p>
-          <a:p>
-            <a:r>
-              <a:rPr lang="en-US" dirty="0" smtClean="0"/>
-              <a:t>* We looked at everything that needed done and everyone took part of the work</a:t>
-            </a:r>
-          </a:p>
-          <a:p>
-            <a:r>
-              <a:rPr lang="en-US" dirty="0" smtClean="0"/>
-              <a:t>* In some cases we even temporarily switched job responsibilities so the people with the right skills could focus on the critical tasks</a:t>
-            </a:r>
-          </a:p>
-          <a:p>
-            <a:r>
-              <a:rPr lang="en-US" dirty="0" smtClean="0"/>
-              <a:t>* We all agreed to put in extra time</a:t>
-            </a:r>
-          </a:p>
-          <a:p>
-            <a:r>
-              <a:rPr lang="en-US" dirty="0" smtClean="0"/>
-              <a:t>* Most importantly, we never gave the VPs a chance to ask "so what do we do now?"</a:t>
+              <a:t>* Programmers are smart people by definition</a:t>
+            </a:r>
+          </a:p>
+          <a:p>
+            <a:r>
+              <a:rPr lang="en-US" dirty="0" smtClean="0"/>
+              <a:t>* We also tend to be a clever and creative bunch, too</a:t>
+            </a:r>
+          </a:p>
+          <a:p>
+            <a:r>
+              <a:rPr lang="en-US" dirty="0" smtClean="0"/>
+              <a:t>* We solve problems for a living and we revel in it</a:t>
+            </a:r>
+          </a:p>
+          <a:p>
+            <a:r>
+              <a:rPr lang="en-US" dirty="0" smtClean="0"/>
+              <a:t>* But none of us have a monopoly on intelligence…</a:t>
+            </a:r>
+          </a:p>
+          <a:p>
+            <a:r>
+              <a:rPr lang="en-US" dirty="0" smtClean="0"/>
+              <a:t>* or cleverness…</a:t>
+            </a:r>
+          </a:p>
+          <a:p>
+            <a:r>
+              <a:rPr lang="en-US" dirty="0" smtClean="0"/>
+              <a:t>* or creativity…</a:t>
+            </a:r>
+          </a:p>
+          <a:p>
+            <a:r>
+              <a:rPr lang="en-US" dirty="0" smtClean="0"/>
+              <a:t>* or innovation</a:t>
+            </a:r>
+          </a:p>
+          <a:p>
+            <a:r>
+              <a:rPr lang="en-US" dirty="0" smtClean="0"/>
+              <a:t>* So we need to put our egos aside and recognize the intelligence, cleverness, creativity, and innovation of our peers</a:t>
+            </a:r>
+          </a:p>
+          <a:p>
+            <a:r>
+              <a:rPr lang="en-US" dirty="0" smtClean="0"/>
+              <a:t>* And we need to celebrate diversity</a:t>
             </a:r>
           </a:p>
           <a:p>
@@ -2039,7 +2197,7 @@
     </p:spTree>
     <p:extLst>
       <p:ext uri="{BB962C8B-B14F-4D97-AF65-F5344CB8AC3E}">
-        <p14:creationId xmlns:p14="http://schemas.microsoft.com/office/powerpoint/2010/main" val="334914484"/>
+        <p14:creationId xmlns:p14="http://schemas.microsoft.com/office/powerpoint/2010/main" val="87374345"/>
       </p:ext>
     </p:extLst>
   </p:cSld>
@@ -2095,25 +2253,34 @@
           <a:p>
             <a:r>
               <a:rPr lang="en-US" dirty="0" smtClean="0"/>
-              <a:t>## Failure are also opportunities</a:t>
-            </a:r>
-          </a:p>
-          <a:p>
-            <a:endParaRPr lang="en-US" dirty="0" smtClean="0"/>
-          </a:p>
-          <a:p>
-            <a:r>
-              <a:rPr lang="en-US" dirty="0" smtClean="0"/>
-              <a:t>Turns out that many users were unhappy with the previous system. It was an online auction system but we weren't running an online auction. We were running a televised auction with online bidding. These are two very different things.</a:t>
-            </a:r>
-          </a:p>
-          <a:p>
-            <a:endParaRPr lang="en-US" dirty="0" smtClean="0"/>
-          </a:p>
-          <a:p>
-            <a:r>
-              <a:rPr lang="en-US" dirty="0" smtClean="0"/>
-              <a:t>We had to start from scratch so we used the opportunity to learn the pain points of the old system and build something better suited to the problem.</a:t>
+              <a:t>## It's better to excel at Plan B</a:t>
+            </a:r>
+          </a:p>
+          <a:p>
+            <a:endParaRPr lang="en-US" dirty="0" smtClean="0"/>
+          </a:p>
+          <a:p>
+            <a:r>
+              <a:rPr lang="en-US" dirty="0" smtClean="0"/>
+              <a:t>Despite our best intentions, sometimes our ideas just don't work out. And it's easy to get frustrated by that. We become emotionally invested in an idea because it *ours* and because it seemed so *good* at first. In the end that's meaningless. It either works or it doesn't. Sometimes we just need to "throw in the towel" and go with Plan B.</a:t>
+            </a:r>
+          </a:p>
+          <a:p>
+            <a:endParaRPr lang="en-US" dirty="0" smtClean="0"/>
+          </a:p>
+          <a:p>
+            <a:r>
+              <a:rPr lang="en-US" dirty="0" smtClean="0"/>
+              <a:t>This presentation is the perfect example. I really, *really* wanted to present my original idea. It just wouldn't come together. I could have spent the day beating away at PowerPoint and trying to force something to come together. I may have even gotten it together well enough to fool my audience. But I would have known. But when I started working on Plan B things really seemed to fall into place. It just worked. I felt good about it. It seemed right.</a:t>
+            </a:r>
+          </a:p>
+          <a:p>
+            <a:endParaRPr lang="en-US" dirty="0" smtClean="0"/>
+          </a:p>
+          <a:p>
+            <a:r>
+              <a:rPr lang="en-US" dirty="0" smtClean="0"/>
+              <a:t>Only you, my audience, can judge whether or not it worked. maybe it didn't. But I *know* that Plan B worked out much better than Plan A would have.</a:t>
             </a:r>
           </a:p>
           <a:p>
@@ -2139,19 +2306,7 @@
           <a:p>
             <a:r>
               <a:rPr lang="en-US" dirty="0" smtClean="0"/>
-              <a:t>* Mistakes are often opportunities to reevaluate what you were doing in the first place</a:t>
-            </a:r>
-          </a:p>
-          <a:p>
-            <a:r>
-              <a:rPr lang="en-US" dirty="0" smtClean="0"/>
-              <a:t>* When something goes bad, make it better</a:t>
-            </a:r>
-          </a:p>
-          <a:p>
-            <a:r>
-              <a:rPr lang="en-US" dirty="0" smtClean="0"/>
-              <a:t>* Always leave things better than you found them</a:t>
+              <a:t>* It's better to excel at Plan B than to be mediocre at Plan A</a:t>
             </a:r>
           </a:p>
           <a:p>
@@ -2185,7 +2340,7 @@
     </p:spTree>
     <p:extLst>
       <p:ext uri="{BB962C8B-B14F-4D97-AF65-F5344CB8AC3E}">
-        <p14:creationId xmlns:p14="http://schemas.microsoft.com/office/powerpoint/2010/main" val="851194640"/>
+        <p14:creationId xmlns:p14="http://schemas.microsoft.com/office/powerpoint/2010/main" val="3908768357"/>
       </p:ext>
     </p:extLst>
   </p:cSld>
@@ -2364,84 +2519,55 @@
           <a:p>
             <a:r>
               <a:rPr lang="en-US" dirty="0" smtClean="0"/>
-              <a:t>## Do the right thing</a:t>
-            </a:r>
-          </a:p>
-          <a:p>
-            <a:endParaRPr lang="en-US" dirty="0" smtClean="0"/>
-          </a:p>
-          <a:p>
-            <a:r>
-              <a:rPr lang="en-US" dirty="0" smtClean="0"/>
-              <a:t>In my next job I found myself taking over a failed project (again). My predecessor was a good person but a bad fit in the role. One of the things he had done poorly was track the money. I spent an inordinate time trying to figure out who he had spent so much money and provided so little software to show for it. One of the things I discovered is that our pay scale for tech contractors was all over the board. Some were grossly overpaid and some were grossly underpaid. The lowest on the pay scale was so low I was embarrassed. But this was his first tech gig and he had been trying to break into the industry so he took what he could get.</a:t>
-            </a:r>
-          </a:p>
-          <a:p>
-            <a:endParaRPr lang="en-US" dirty="0" smtClean="0"/>
-          </a:p>
-          <a:p>
-            <a:r>
-              <a:rPr lang="en-US" dirty="0" smtClean="0"/>
-              <a:t>I heard through the grapevine that this programmer was also talking to a local contracting firm. A very well-respected and well-known firm. With a few months of professional work under his belt he had more to talk about now. In the short time I knew him I recognized that he was smart, hard working, industrious, and probably had a great career ahead of him. Given the tight job market I didn't want to lose him, but I also knew we weren't paying him squat and couldn't offer him health insurance. Fortunately for me I knew the owner of the consulting company personally, so I gave him a call and met up with him at his office.</a:t>
-            </a:r>
-          </a:p>
-          <a:p>
-            <a:endParaRPr lang="en-US" dirty="0" smtClean="0"/>
-          </a:p>
-          <a:p>
-            <a:r>
-              <a:rPr lang="en-US" dirty="0" smtClean="0"/>
-              <a:t>I cut through the BS and told him I knew he was talking to my programmer. He admitted he was. I told him that I would like to keep the programmer on my project but that I knew the value he would gain by jumping ship. So I suggested they give him a job then I contract him back to my project. We did some back-of-the-napkin calculations based on what they were thinking of offering him and we shook hands. They followed-up with the programmer and eventually everything came together. It cost me a lot more money but nothing that wasn't perfectly reasonable for the market at the time and nothing that my budget couldn't handle. Everyone won.</a:t>
-            </a:r>
-          </a:p>
-          <a:p>
-            <a:endParaRPr lang="en-US" dirty="0" smtClean="0"/>
-          </a:p>
-          <a:p>
-            <a:r>
-              <a:rPr lang="en-US" dirty="0" smtClean="0"/>
-              <a:t>&lt;</a:t>
-            </a:r>
-            <a:r>
-              <a:rPr lang="en-US" dirty="0" err="1" smtClean="0"/>
-              <a:t>hr</a:t>
-            </a:r>
-            <a:r>
-              <a:rPr lang="en-US" dirty="0" smtClean="0"/>
-              <a:t> /&gt;</a:t>
-            </a:r>
-          </a:p>
-          <a:p>
-            <a:endParaRPr lang="en-US" dirty="0" smtClean="0"/>
-          </a:p>
-          <a:p>
-            <a:r>
-              <a:rPr lang="en-US" dirty="0" smtClean="0"/>
-              <a:t>* You have a conscience</a:t>
-            </a:r>
-          </a:p>
-          <a:p>
-            <a:r>
-              <a:rPr lang="en-US" dirty="0" smtClean="0"/>
-              <a:t>* It's smarter than you are</a:t>
-            </a:r>
-          </a:p>
-          <a:p>
-            <a:r>
-              <a:rPr lang="en-US" dirty="0" smtClean="0"/>
-              <a:t>* Sometimes it's very hard to do the right thing</a:t>
-            </a:r>
-          </a:p>
-          <a:p>
-            <a:r>
-              <a:rPr lang="en-US" dirty="0" smtClean="0"/>
-              <a:t>* Do it anyway</a:t>
-            </a:r>
-          </a:p>
-          <a:p>
-            <a:r>
-              <a:rPr lang="en-US" dirty="0" smtClean="0"/>
-              <a:t>* Your life will be better for it</a:t>
+              <a:t>## Do what you love, love what you do</a:t>
+            </a:r>
+          </a:p>
+          <a:p>
+            <a:endParaRPr lang="en-US" dirty="0" smtClean="0"/>
+          </a:p>
+          <a:p>
+            <a:r>
+              <a:rPr lang="en-US" dirty="0" smtClean="0"/>
+              <a:t>My parting advice to you can be summed up in one word: *Love*</a:t>
+            </a:r>
+          </a:p>
+          <a:p>
+            <a:endParaRPr lang="en-US" dirty="0" smtClean="0"/>
+          </a:p>
+          <a:p>
+            <a:r>
+              <a:rPr lang="en-US" dirty="0" smtClean="0"/>
+              <a:t>* Do what you love</a:t>
+            </a:r>
+          </a:p>
+          <a:p>
+            <a:r>
+              <a:rPr lang="en-US" dirty="0" smtClean="0"/>
+              <a:t>* Love what you do</a:t>
+            </a:r>
+          </a:p>
+          <a:p>
+            <a:r>
+              <a:rPr lang="en-US" dirty="0" smtClean="0"/>
+              <a:t>* Love your life</a:t>
+            </a:r>
+          </a:p>
+          <a:p>
+            <a:r>
+              <a:rPr lang="en-US" dirty="0" smtClean="0"/>
+              <a:t>* Love your family</a:t>
+            </a:r>
+          </a:p>
+          <a:p>
+            <a:r>
+              <a:rPr lang="en-US" dirty="0" smtClean="0"/>
+              <a:t>* Love your job</a:t>
+            </a:r>
+          </a:p>
+          <a:p>
+            <a:r>
+              <a:rPr lang="en-US" dirty="0" smtClean="0"/>
+              <a:t>* Love your life</a:t>
             </a:r>
           </a:p>
           <a:p>
@@ -2475,7 +2601,7 @@
     </p:spTree>
     <p:extLst>
       <p:ext uri="{BB962C8B-B14F-4D97-AF65-F5344CB8AC3E}">
-        <p14:creationId xmlns:p14="http://schemas.microsoft.com/office/powerpoint/2010/main" val="3810211361"/>
+        <p14:creationId xmlns:p14="http://schemas.microsoft.com/office/powerpoint/2010/main" val="3962093413"/>
       </p:ext>
     </p:extLst>
   </p:cSld>
@@ -2531,111 +2657,43 @@
           <a:p>
             <a:r>
               <a:rPr lang="en-US" dirty="0" smtClean="0"/>
-              <a:t>## My team gets credit, I get blame</a:t>
-            </a:r>
-          </a:p>
-          <a:p>
-            <a:endParaRPr lang="en-US" dirty="0" smtClean="0"/>
-          </a:p>
-          <a:p>
-            <a:r>
-              <a:rPr lang="en-US" dirty="0" smtClean="0"/>
-              <a:t>So we get the project turned around and we start cranking out code. We made some very pragmatic decisions but the funder was happy and stopped threatening to pull the funds. Then one day one of the members of the business team--someone I workers with at my previous job and someone with whom I shared tremendous mutual respect--got upset over a feature.</a:t>
-            </a:r>
-          </a:p>
-          <a:p>
-            <a:endParaRPr lang="en-US" dirty="0" smtClean="0"/>
-          </a:p>
-          <a:p>
-            <a:r>
-              <a:rPr lang="en-US" dirty="0" smtClean="0"/>
-              <a:t>So we're sitting in the office and he is uncharacteristically angry. Fuming mad actually. I thought the actual bug was very minor but it was important to him so it was important to me. He kept asking me which programmer worked on the feature and I kept refusing to tell him.</a:t>
-            </a:r>
-          </a:p>
-          <a:p>
-            <a:endParaRPr lang="en-US" dirty="0" smtClean="0"/>
-          </a:p>
-          <a:p>
-            <a:r>
-              <a:rPr lang="en-US" dirty="0" smtClean="0"/>
-              <a:t>"You're not going to tell me who this was, are you?" he asked. "No matter how hard I push."</a:t>
-            </a:r>
-          </a:p>
-          <a:p>
-            <a:endParaRPr lang="en-US" dirty="0" smtClean="0"/>
-          </a:p>
-          <a:p>
-            <a:r>
-              <a:rPr lang="en-US" dirty="0" smtClean="0"/>
-              <a:t>"No" I said, "I am not." I continued. "I understand you are unhappy and I am going to do everything I can to make this right, but I won't throw one of my team under the bus. I am the boss. I am responsible. I set the expectations for my team, I set the standards for my team, I create their process and I assign them their work. We failed you, which means I failed them. You and I will talk as long as necessary to figure out how we can improve the process, make this right, and prevent it in the future. But I will not make this a finger pointing exercise. Point the finger at me, get your frustration out of your system, then we'll get to work."</a:t>
-            </a:r>
-          </a:p>
-          <a:p>
-            <a:endParaRPr lang="en-US" dirty="0" smtClean="0"/>
-          </a:p>
-          <a:p>
-            <a:r>
-              <a:rPr lang="en-US" dirty="0" smtClean="0"/>
-              <a:t>&lt;</a:t>
-            </a:r>
-            <a:r>
-              <a:rPr lang="en-US" dirty="0" err="1" smtClean="0"/>
-              <a:t>hr</a:t>
-            </a:r>
-            <a:r>
-              <a:rPr lang="en-US" dirty="0" smtClean="0"/>
-              <a:t> /&gt;</a:t>
-            </a:r>
-          </a:p>
-          <a:p>
-            <a:endParaRPr lang="en-US" dirty="0" smtClean="0"/>
-          </a:p>
-          <a:p>
-            <a:r>
-              <a:rPr lang="en-US" dirty="0" smtClean="0"/>
-              <a:t>* When a team performs will the leader will get credit</a:t>
-            </a:r>
-          </a:p>
-          <a:p>
-            <a:r>
-              <a:rPr lang="en-US" dirty="0" smtClean="0"/>
-              <a:t>* There is never a reason for a leader to steal credit from an individual team member</a:t>
-            </a:r>
-          </a:p>
-          <a:p>
-            <a:r>
-              <a:rPr lang="en-US" dirty="0" smtClean="0"/>
-              <a:t>* Let everyone know the good work each team member is doing and you'll still look good as the leader</a:t>
-            </a:r>
-          </a:p>
-          <a:p>
-            <a:r>
-              <a:rPr lang="en-US" dirty="0" smtClean="0"/>
-              <a:t>* But when things go bad, shield the team</a:t>
-            </a:r>
-          </a:p>
-          <a:p>
-            <a:r>
-              <a:rPr lang="en-US" dirty="0" smtClean="0"/>
-              <a:t>* Take responsibility for your role as leader</a:t>
-            </a:r>
-          </a:p>
-          <a:p>
-            <a:r>
-              <a:rPr lang="en-US" dirty="0" smtClean="0"/>
-              <a:t>* If an individual team member needs coaching do it in private</a:t>
-            </a:r>
-          </a:p>
-          <a:p>
-            <a:r>
-              <a:rPr lang="en-US" dirty="0" smtClean="0"/>
-              <a:t>* People feel bad when their team makes a mistake</a:t>
-            </a:r>
-          </a:p>
-          <a:p>
-            <a:r>
-              <a:rPr lang="en-US" dirty="0" smtClean="0"/>
-              <a:t>* Never compound it by dividing the team</a:t>
+              <a:t>## This job is not about</a:t>
+            </a:r>
+          </a:p>
+          <a:p>
+            <a:endParaRPr lang="en-US" dirty="0" smtClean="0"/>
+          </a:p>
+          <a:p>
+            <a:r>
+              <a:rPr lang="en-US" dirty="0" smtClean="0"/>
+              <a:t>And always remember:</a:t>
+            </a:r>
+          </a:p>
+          <a:p>
+            <a:endParaRPr lang="en-US" dirty="0" smtClean="0"/>
+          </a:p>
+          <a:p>
+            <a:r>
+              <a:rPr lang="en-US" dirty="0" smtClean="0"/>
+              <a:t>* This job is not about the code</a:t>
+            </a:r>
+          </a:p>
+          <a:p>
+            <a:r>
+              <a:rPr lang="en-US" dirty="0" smtClean="0"/>
+              <a:t>* This job is not about the tech</a:t>
+            </a:r>
+          </a:p>
+          <a:p>
+            <a:r>
+              <a:rPr lang="en-US" dirty="0" smtClean="0"/>
+              <a:t>* This job is not about the problem</a:t>
+            </a:r>
+          </a:p>
+          <a:p>
+            <a:r>
+              <a:rPr lang="en-US" dirty="0" smtClean="0"/>
+              <a:t>* This job is not about the solution</a:t>
             </a:r>
           </a:p>
           <a:p>
@@ -2669,7 +2727,7 @@
     </p:spTree>
     <p:extLst>
       <p:ext uri="{BB962C8B-B14F-4D97-AF65-F5344CB8AC3E}">
-        <p14:creationId xmlns:p14="http://schemas.microsoft.com/office/powerpoint/2010/main" val="1843141395"/>
+        <p14:creationId xmlns:p14="http://schemas.microsoft.com/office/powerpoint/2010/main" val="3879776579"/>
       </p:ext>
     </p:extLst>
   </p:cSld>
@@ -2725,1248 +2783,6 @@
           <a:p>
             <a:r>
               <a:rPr lang="en-US" dirty="0" smtClean="0"/>
-              <a:t>## Be true to yourself</a:t>
-            </a:r>
-          </a:p>
-          <a:p>
-            <a:endParaRPr lang="en-US" dirty="0" smtClean="0"/>
-          </a:p>
-          <a:p>
-            <a:r>
-              <a:rPr lang="en-US" dirty="0" smtClean="0"/>
-              <a:t>I ended up leaving that job to go back to programming. I've spent at least as much time over my career being the boss as I have being a coder. If the people I've worked with are to be believed, I'm pretty good at the whole boss thing. When I decided to go back to a non-boss role several people who knew me were very surprised. "But you're so good at it!" is the usual refrain.</a:t>
-            </a:r>
-          </a:p>
-          <a:p>
-            <a:endParaRPr lang="en-US" dirty="0" smtClean="0"/>
-          </a:p>
-          <a:p>
-            <a:r>
-              <a:rPr lang="en-US" dirty="0" smtClean="0"/>
-              <a:t>Truth is, there is nothing I ever do as a manager that makes me as happy as writing code. The only good days are the days where I spend most of my time in Vim, writing code.</a:t>
-            </a:r>
-          </a:p>
-          <a:p>
-            <a:endParaRPr lang="en-US" dirty="0" smtClean="0"/>
-          </a:p>
-          <a:p>
-            <a:r>
-              <a:rPr lang="en-US" dirty="0" smtClean="0"/>
-              <a:t>One of the guys on my team now worked with me on another project a few years ago. When we met up again to talk about this gig he noticed I was dressed nicer. ""Did you go out and but a bunch of nice clothes?" he asked. "Just the opposite" I explained. I had to buy a bunch of T-shirts when I worked with you last. When I started working with a bunch of young, hipster </a:t>
-            </a:r>
-            <a:r>
-              <a:rPr lang="en-US" dirty="0" err="1" smtClean="0"/>
-              <a:t>Rubyists</a:t>
-            </a:r>
-            <a:r>
-              <a:rPr lang="en-US" dirty="0" smtClean="0"/>
-              <a:t> I tried to fit in. Truth is I am neither young nor a hipster and I finally realized it was time I stopped pretending I was either.</a:t>
-            </a:r>
-          </a:p>
-          <a:p>
-            <a:endParaRPr lang="en-US" dirty="0" smtClean="0"/>
-          </a:p>
-          <a:p>
-            <a:r>
-              <a:rPr lang="en-US" dirty="0" smtClean="0"/>
-              <a:t>&lt;</a:t>
-            </a:r>
-            <a:r>
-              <a:rPr lang="en-US" dirty="0" err="1" smtClean="0"/>
-              <a:t>hr</a:t>
-            </a:r>
-            <a:r>
-              <a:rPr lang="en-US" dirty="0" smtClean="0"/>
-              <a:t> /&gt;</a:t>
-            </a:r>
-          </a:p>
-          <a:p>
-            <a:endParaRPr lang="en-US" dirty="0" smtClean="0"/>
-          </a:p>
-          <a:p>
-            <a:r>
-              <a:rPr lang="en-US" dirty="0" smtClean="0"/>
-              <a:t>* You are who you are</a:t>
-            </a:r>
-          </a:p>
-          <a:p>
-            <a:r>
-              <a:rPr lang="en-US" dirty="0" smtClean="0"/>
-              <a:t>* Embrace that, don't deny that</a:t>
-            </a:r>
-          </a:p>
-          <a:p>
-            <a:r>
-              <a:rPr lang="en-US" dirty="0" smtClean="0"/>
-              <a:t>* Being good at something isn't the same thing as being happy doing it</a:t>
-            </a:r>
-          </a:p>
-          <a:p>
-            <a:r>
-              <a:rPr lang="en-US" dirty="0" smtClean="0"/>
-              <a:t>* You will always be more happy and more genuine if you embrace the real you</a:t>
-            </a:r>
-          </a:p>
-          <a:p>
-            <a:r>
-              <a:rPr lang="en-US" dirty="0" smtClean="0"/>
-              <a:t>* Screw everyone else if they don't like it</a:t>
-            </a:r>
-          </a:p>
-          <a:p>
-            <a:endParaRPr lang="en-US" dirty="0"/>
-          </a:p>
-        </p:txBody>
-      </p:sp>
-      <p:sp>
-        <p:nvSpPr>
-          <p:cNvPr id="4" name="Slide Number Placeholder 3"/>
-          <p:cNvSpPr>
-            <a:spLocks noGrp="1"/>
-          </p:cNvSpPr>
-          <p:nvPr>
-            <p:ph type="sldNum" sz="quarter" idx="10"/>
-          </p:nvPr>
-        </p:nvSpPr>
-        <p:spPr/>
-        <p:txBody>
-          <a:bodyPr/>
-          <a:lstStyle/>
-          <a:p>
-            <a:fld id="{958C039F-46F0-764D-AFCF-CD78D3455824}" type="slidenum">
-              <a:rPr lang="en-US" smtClean="0"/>
-              <a:t>22</a:t>
-            </a:fld>
-            <a:endParaRPr lang="en-US"/>
-          </a:p>
-        </p:txBody>
-      </p:sp>
-    </p:spTree>
-    <p:extLst>
-      <p:ext uri="{BB962C8B-B14F-4D97-AF65-F5344CB8AC3E}">
-        <p14:creationId xmlns:p14="http://schemas.microsoft.com/office/powerpoint/2010/main" val="374399553"/>
-      </p:ext>
-    </p:extLst>
-  </p:cSld>
-  <p:clrMapOvr>
-    <a:masterClrMapping/>
-  </p:clrMapOvr>
-</p:notes>
-</file>
-
-<file path=ppt/notesSlides/notesSlide23.xml><?xml version="1.0" encoding="utf-8"?>
-<p:notes xmlns:a="http://schemas.openxmlformats.org/drawingml/2006/main" xmlns:r="http://schemas.openxmlformats.org/officeDocument/2006/relationships" xmlns:p="http://schemas.openxmlformats.org/presentationml/2006/main">
-  <p:cSld>
-    <p:spTree>
-      <p:nvGrpSpPr>
-        <p:cNvPr id="1" name=""/>
-        <p:cNvGrpSpPr/>
-        <p:nvPr/>
-      </p:nvGrpSpPr>
-      <p:grpSpPr>
-        <a:xfrm>
-          <a:off x="0" y="0"/>
-          <a:ext cx="0" cy="0"/>
-          <a:chOff x="0" y="0"/>
-          <a:chExt cx="0" cy="0"/>
-        </a:xfrm>
-      </p:grpSpPr>
-      <p:sp>
-        <p:nvSpPr>
-          <p:cNvPr id="2" name="Slide Image Placeholder 1"/>
-          <p:cNvSpPr>
-            <a:spLocks noGrp="1" noRot="1" noChangeAspect="1"/>
-          </p:cNvSpPr>
-          <p:nvPr>
-            <p:ph type="sldImg"/>
-          </p:nvPr>
-        </p:nvSpPr>
-        <p:spPr/>
-      </p:sp>
-      <p:sp>
-        <p:nvSpPr>
-          <p:cNvPr id="3" name="Notes Placeholder 2"/>
-          <p:cNvSpPr>
-            <a:spLocks noGrp="1"/>
-          </p:cNvSpPr>
-          <p:nvPr>
-            <p:ph type="body" idx="1"/>
-          </p:nvPr>
-        </p:nvSpPr>
-        <p:spPr/>
-        <p:txBody>
-          <a:bodyPr/>
-          <a:lstStyle/>
-          <a:p>
-            <a:r>
-              <a:rPr lang="en-US" dirty="0" smtClean="0"/>
-              <a:t>## Sometimes people screw up</a:t>
-            </a:r>
-          </a:p>
-          <a:p>
-            <a:endParaRPr lang="en-US" dirty="0" smtClean="0"/>
-          </a:p>
-          <a:p>
-            <a:r>
-              <a:rPr lang="en-US" dirty="0" smtClean="0"/>
-              <a:t>I'm at my first non-management job in a few years and I'm immediately given two very difficult projects. I have the experience and my boss felt I would be the best fit. I developed what I thought were good solutions but they required us to do some things with the servers that we hadn't done before. I was very open about this with my boss and our </a:t>
-            </a:r>
-            <a:r>
-              <a:rPr lang="en-US" dirty="0" err="1" smtClean="0"/>
-              <a:t>devops</a:t>
-            </a:r>
-            <a:r>
-              <a:rPr lang="en-US" dirty="0" smtClean="0"/>
-              <a:t> person and I was assured things would get done.</a:t>
-            </a:r>
-          </a:p>
-          <a:p>
-            <a:endParaRPr lang="en-US" dirty="0" smtClean="0"/>
-          </a:p>
-          <a:p>
-            <a:r>
-              <a:rPr lang="en-US" dirty="0" smtClean="0"/>
-              <a:t>After three months and numerous reminders from me things still hadn't gotten done. I repeatedly warned my boss that bad things might happen. Each time I was told that I was not going to be given the necessary server access to get it done myself but that our </a:t>
-            </a:r>
-            <a:r>
-              <a:rPr lang="en-US" dirty="0" err="1" smtClean="0"/>
-              <a:t>devops</a:t>
-            </a:r>
-            <a:r>
-              <a:rPr lang="en-US" dirty="0" smtClean="0"/>
-              <a:t> person would do. Eventually it came time to released and we had not adequately tested. And things went badly as expected.</a:t>
-            </a:r>
-          </a:p>
-          <a:p>
-            <a:endParaRPr lang="en-US" dirty="0" smtClean="0"/>
-          </a:p>
-          <a:p>
-            <a:r>
-              <a:rPr lang="en-US" dirty="0" smtClean="0"/>
-              <a:t>To everyone's credit there was no blaming. We just got together as a team and fixed things. Once we got everything working it became clear that we would have found all the problems had we done the testing I had repeatedly asked for.</a:t>
-            </a:r>
-          </a:p>
-          <a:p>
-            <a:endParaRPr lang="en-US" dirty="0" smtClean="0"/>
-          </a:p>
-          <a:p>
-            <a:r>
-              <a:rPr lang="en-US" dirty="0" smtClean="0"/>
-              <a:t>At my request there was a private meeting between myself, my boss, and our </a:t>
-            </a:r>
-            <a:r>
-              <a:rPr lang="en-US" dirty="0" err="1" smtClean="0"/>
-              <a:t>devops</a:t>
-            </a:r>
-            <a:r>
-              <a:rPr lang="en-US" dirty="0" smtClean="0"/>
-              <a:t>. I had no interest in making anything more public than it already was, but I wanted to discuss what went wrong so we could avoid making the same mistakes again. What I was told was "No one is blaming you, but sometimes things just happen. We handled it so we should just move on."</a:t>
-            </a:r>
-          </a:p>
-          <a:p>
-            <a:endParaRPr lang="en-US" dirty="0" smtClean="0"/>
-          </a:p>
-          <a:p>
-            <a:r>
-              <a:rPr lang="en-US" dirty="0" smtClean="0"/>
-              <a:t>I couldn't disagree more.</a:t>
-            </a:r>
-          </a:p>
-          <a:p>
-            <a:endParaRPr lang="en-US" dirty="0" smtClean="0"/>
-          </a:p>
-          <a:p>
-            <a:r>
-              <a:rPr lang="en-US" dirty="0" smtClean="0"/>
-              <a:t>I'm glad no on was blaming me because it wasn't my fault. In fact, I had made repeated attempts to avoid these exact problems. What I mostly took issue with, however, was the "sometimes things happen" attitude. Sure, sometimes things do just "happen" but sometimes people actually screw up. It's important to recognize the difference and act appropriately.</a:t>
-            </a:r>
-          </a:p>
-          <a:p>
-            <a:endParaRPr lang="en-US" dirty="0" smtClean="0"/>
-          </a:p>
-          <a:p>
-            <a:r>
-              <a:rPr lang="en-US" dirty="0" smtClean="0"/>
-              <a:t>In this case, someone screwed up. We never should have gotten ourselves in that situation. It was completely avoidable.</a:t>
-            </a:r>
-          </a:p>
-          <a:p>
-            <a:endParaRPr lang="en-US" dirty="0" smtClean="0"/>
-          </a:p>
-          <a:p>
-            <a:r>
-              <a:rPr lang="en-US" dirty="0" smtClean="0"/>
-              <a:t>&lt;</a:t>
-            </a:r>
-            <a:r>
-              <a:rPr lang="en-US" dirty="0" err="1" smtClean="0"/>
-              <a:t>hr</a:t>
-            </a:r>
-            <a:r>
-              <a:rPr lang="en-US" dirty="0" smtClean="0"/>
-              <a:t> /&gt;</a:t>
-            </a:r>
-          </a:p>
-          <a:p>
-            <a:endParaRPr lang="en-US" dirty="0" smtClean="0"/>
-          </a:p>
-          <a:p>
-            <a:r>
-              <a:rPr lang="en-US" dirty="0" smtClean="0"/>
-              <a:t>* People make mistakes, it's part of being human</a:t>
-            </a:r>
-          </a:p>
-          <a:p>
-            <a:r>
-              <a:rPr lang="en-US" dirty="0" smtClean="0"/>
-              <a:t>* When you make a mistake be accountable</a:t>
-            </a:r>
-          </a:p>
-          <a:p>
-            <a:r>
-              <a:rPr lang="en-US" dirty="0" smtClean="0"/>
-              <a:t>* Accept that you made a mistake</a:t>
-            </a:r>
-          </a:p>
-          <a:p>
-            <a:r>
-              <a:rPr lang="en-US" dirty="0" smtClean="0"/>
-              <a:t>* It doesn't make you a bad person</a:t>
-            </a:r>
-          </a:p>
-          <a:p>
-            <a:r>
-              <a:rPr lang="en-US" dirty="0" smtClean="0"/>
-              <a:t>* Denying the mistake does</a:t>
-            </a:r>
-          </a:p>
-          <a:p>
-            <a:r>
-              <a:rPr lang="en-US" dirty="0" smtClean="0"/>
-              <a:t>* Learn from your mistakes and move on</a:t>
-            </a:r>
-          </a:p>
-          <a:p>
-            <a:endParaRPr lang="en-US" dirty="0"/>
-          </a:p>
-        </p:txBody>
-      </p:sp>
-      <p:sp>
-        <p:nvSpPr>
-          <p:cNvPr id="4" name="Slide Number Placeholder 3"/>
-          <p:cNvSpPr>
-            <a:spLocks noGrp="1"/>
-          </p:cNvSpPr>
-          <p:nvPr>
-            <p:ph type="sldNum" sz="quarter" idx="10"/>
-          </p:nvPr>
-        </p:nvSpPr>
-        <p:spPr/>
-        <p:txBody>
-          <a:bodyPr/>
-          <a:lstStyle/>
-          <a:p>
-            <a:fld id="{958C039F-46F0-764D-AFCF-CD78D3455824}" type="slidenum">
-              <a:rPr lang="en-US" smtClean="0"/>
-              <a:t>23</a:t>
-            </a:fld>
-            <a:endParaRPr lang="en-US"/>
-          </a:p>
-        </p:txBody>
-      </p:sp>
-    </p:spTree>
-    <p:extLst>
-      <p:ext uri="{BB962C8B-B14F-4D97-AF65-F5344CB8AC3E}">
-        <p14:creationId xmlns:p14="http://schemas.microsoft.com/office/powerpoint/2010/main" val="2871523659"/>
-      </p:ext>
-    </p:extLst>
-  </p:cSld>
-  <p:clrMapOvr>
-    <a:masterClrMapping/>
-  </p:clrMapOvr>
-</p:notes>
-</file>
-
-<file path=ppt/notesSlides/notesSlide24.xml><?xml version="1.0" encoding="utf-8"?>
-<p:notes xmlns:a="http://schemas.openxmlformats.org/drawingml/2006/main" xmlns:r="http://schemas.openxmlformats.org/officeDocument/2006/relationships" xmlns:p="http://schemas.openxmlformats.org/presentationml/2006/main">
-  <p:cSld>
-    <p:spTree>
-      <p:nvGrpSpPr>
-        <p:cNvPr id="1" name=""/>
-        <p:cNvGrpSpPr/>
-        <p:nvPr/>
-      </p:nvGrpSpPr>
-      <p:grpSpPr>
-        <a:xfrm>
-          <a:off x="0" y="0"/>
-          <a:ext cx="0" cy="0"/>
-          <a:chOff x="0" y="0"/>
-          <a:chExt cx="0" cy="0"/>
-        </a:xfrm>
-      </p:grpSpPr>
-      <p:sp>
-        <p:nvSpPr>
-          <p:cNvPr id="2" name="Slide Image Placeholder 1"/>
-          <p:cNvSpPr>
-            <a:spLocks noGrp="1" noRot="1" noChangeAspect="1"/>
-          </p:cNvSpPr>
-          <p:nvPr>
-            <p:ph type="sldImg"/>
-          </p:nvPr>
-        </p:nvSpPr>
-        <p:spPr/>
-      </p:sp>
-      <p:sp>
-        <p:nvSpPr>
-          <p:cNvPr id="3" name="Notes Placeholder 2"/>
-          <p:cNvSpPr>
-            <a:spLocks noGrp="1"/>
-          </p:cNvSpPr>
-          <p:nvPr>
-            <p:ph type="body" idx="1"/>
-          </p:nvPr>
-        </p:nvSpPr>
-        <p:spPr/>
-        <p:txBody>
-          <a:bodyPr/>
-          <a:lstStyle/>
-          <a:p>
-            <a:r>
-              <a:rPr lang="en-US" dirty="0" smtClean="0"/>
-              <a:t>## Take Risks</a:t>
-            </a:r>
-          </a:p>
-          <a:p>
-            <a:endParaRPr lang="en-US" dirty="0" smtClean="0"/>
-          </a:p>
-          <a:p>
-            <a:r>
-              <a:rPr lang="en-US" dirty="0" smtClean="0"/>
-              <a:t>So now I'm nearly 20 years into my career. I've been a student, a teacher, a boss, and a teammate. I'm very established in my area and have a pretty good (thought not spotless) reputation. I work for a great company doing interesting work with some of the best tech professionals I have ever met. By all accounts my career is good. But that's no excuse for resting on my laurels.</a:t>
-            </a:r>
-          </a:p>
-          <a:p>
-            <a:endParaRPr lang="en-US" dirty="0" smtClean="0"/>
-          </a:p>
-          <a:p>
-            <a:r>
-              <a:rPr lang="en-US" dirty="0" smtClean="0"/>
-              <a:t>I've never spoken at a major conference before. I've had plenty of experience speaking publicly but it's mostly been in the classroom and at user group meetings. Speaking in front of 100+ strangers at a conference is something I haven't done. But I'm proud of the work I'm doing these days and I think others can benefit from what we're doing so I want to share. So on a lark I submit three abstracts to a conference on the complete opposite end of the country. I had no expectation whatsoever that I would get invited to speak. Famous last words, as they say. So I presented last week at </a:t>
-            </a:r>
-            <a:r>
-              <a:rPr lang="en-US" dirty="0" err="1" smtClean="0"/>
-              <a:t>CascadiaRuby</a:t>
-            </a:r>
-            <a:r>
-              <a:rPr lang="en-US" dirty="0" smtClean="0"/>
-              <a:t> in Portland. Today I'm speaking at </a:t>
-            </a:r>
-            <a:r>
-              <a:rPr lang="en-US" dirty="0" err="1" smtClean="0"/>
-              <a:t>DevBootCamp</a:t>
-            </a:r>
-            <a:r>
-              <a:rPr lang="en-US" dirty="0" smtClean="0"/>
-              <a:t> in Chicago. In January I'm speaking at </a:t>
-            </a:r>
-            <a:r>
-              <a:rPr lang="en-US" dirty="0" err="1" smtClean="0"/>
-              <a:t>CodeMash</a:t>
-            </a:r>
-            <a:r>
-              <a:rPr lang="en-US" dirty="0" smtClean="0"/>
-              <a:t> in Ohio. And next week, in the biggest surprise of all, I'm speaking at *the* </a:t>
-            </a:r>
-            <a:r>
-              <a:rPr lang="en-US" dirty="0" err="1" smtClean="0"/>
-              <a:t>RubyConf</a:t>
-            </a:r>
-            <a:r>
-              <a:rPr lang="en-US" dirty="0" smtClean="0"/>
-              <a:t> in Miami Beach.</a:t>
-            </a:r>
-          </a:p>
-          <a:p>
-            <a:endParaRPr lang="en-US" dirty="0" smtClean="0"/>
-          </a:p>
-          <a:p>
-            <a:r>
-              <a:rPr lang="en-US" dirty="0" smtClean="0"/>
-              <a:t>&lt;</a:t>
-            </a:r>
-            <a:r>
-              <a:rPr lang="en-US" dirty="0" err="1" smtClean="0"/>
-              <a:t>hr</a:t>
-            </a:r>
-            <a:r>
-              <a:rPr lang="en-US" dirty="0" smtClean="0"/>
-              <a:t> /&gt;</a:t>
-            </a:r>
-          </a:p>
-          <a:p>
-            <a:endParaRPr lang="en-US" dirty="0" smtClean="0"/>
-          </a:p>
-          <a:p>
-            <a:r>
-              <a:rPr lang="en-US" dirty="0" smtClean="0"/>
-              <a:t>* There are always opportunities to do more</a:t>
-            </a:r>
-          </a:p>
-          <a:p>
-            <a:r>
-              <a:rPr lang="en-US" dirty="0" smtClean="0"/>
-              <a:t>* Never stop challenging yourself</a:t>
-            </a:r>
-          </a:p>
-          <a:p>
-            <a:r>
-              <a:rPr lang="en-US" dirty="0" smtClean="0"/>
-              <a:t>* Some risks won't pay off</a:t>
-            </a:r>
-          </a:p>
-          <a:p>
-            <a:r>
-              <a:rPr lang="en-US" dirty="0" smtClean="0"/>
-              <a:t>* But there are no rewards without risk</a:t>
-            </a:r>
-          </a:p>
-          <a:p>
-            <a:r>
-              <a:rPr lang="en-US" dirty="0" smtClean="0"/>
-              <a:t>* As my father used to say, "The worst they can do is say 'No"</a:t>
-            </a:r>
-          </a:p>
-          <a:p>
-            <a:endParaRPr lang="en-US" dirty="0"/>
-          </a:p>
-        </p:txBody>
-      </p:sp>
-      <p:sp>
-        <p:nvSpPr>
-          <p:cNvPr id="4" name="Slide Number Placeholder 3"/>
-          <p:cNvSpPr>
-            <a:spLocks noGrp="1"/>
-          </p:cNvSpPr>
-          <p:nvPr>
-            <p:ph type="sldNum" sz="quarter" idx="10"/>
-          </p:nvPr>
-        </p:nvSpPr>
-        <p:spPr/>
-        <p:txBody>
-          <a:bodyPr/>
-          <a:lstStyle/>
-          <a:p>
-            <a:fld id="{958C039F-46F0-764D-AFCF-CD78D3455824}" type="slidenum">
-              <a:rPr lang="en-US" smtClean="0"/>
-              <a:t>24</a:t>
-            </a:fld>
-            <a:endParaRPr lang="en-US"/>
-          </a:p>
-        </p:txBody>
-      </p:sp>
-    </p:spTree>
-    <p:extLst>
-      <p:ext uri="{BB962C8B-B14F-4D97-AF65-F5344CB8AC3E}">
-        <p14:creationId xmlns:p14="http://schemas.microsoft.com/office/powerpoint/2010/main" val="2175515360"/>
-      </p:ext>
-    </p:extLst>
-  </p:cSld>
-  <p:clrMapOvr>
-    <a:masterClrMapping/>
-  </p:clrMapOvr>
-</p:notes>
-</file>
-
-<file path=ppt/notesSlides/notesSlide25.xml><?xml version="1.0" encoding="utf-8"?>
-<p:notes xmlns:a="http://schemas.openxmlformats.org/drawingml/2006/main" xmlns:r="http://schemas.openxmlformats.org/officeDocument/2006/relationships" xmlns:p="http://schemas.openxmlformats.org/presentationml/2006/main">
-  <p:cSld>
-    <p:spTree>
-      <p:nvGrpSpPr>
-        <p:cNvPr id="1" name=""/>
-        <p:cNvGrpSpPr/>
-        <p:nvPr/>
-      </p:nvGrpSpPr>
-      <p:grpSpPr>
-        <a:xfrm>
-          <a:off x="0" y="0"/>
-          <a:ext cx="0" cy="0"/>
-          <a:chOff x="0" y="0"/>
-          <a:chExt cx="0" cy="0"/>
-        </a:xfrm>
-      </p:grpSpPr>
-      <p:sp>
-        <p:nvSpPr>
-          <p:cNvPr id="2" name="Slide Image Placeholder 1"/>
-          <p:cNvSpPr>
-            <a:spLocks noGrp="1" noRot="1" noChangeAspect="1"/>
-          </p:cNvSpPr>
-          <p:nvPr>
-            <p:ph type="sldImg"/>
-          </p:nvPr>
-        </p:nvSpPr>
-        <p:spPr/>
-      </p:sp>
-      <p:sp>
-        <p:nvSpPr>
-          <p:cNvPr id="3" name="Notes Placeholder 2"/>
-          <p:cNvSpPr>
-            <a:spLocks noGrp="1"/>
-          </p:cNvSpPr>
-          <p:nvPr>
-            <p:ph type="body" idx="1"/>
-          </p:nvPr>
-        </p:nvSpPr>
-        <p:spPr/>
-        <p:txBody>
-          <a:bodyPr/>
-          <a:lstStyle/>
-          <a:p>
-            <a:r>
-              <a:rPr lang="en-US" dirty="0" smtClean="0"/>
-              <a:t>## Sometimes the best idea isn't yours</a:t>
-            </a:r>
-          </a:p>
-          <a:p>
-            <a:endParaRPr lang="en-US" dirty="0" smtClean="0"/>
-          </a:p>
-          <a:p>
-            <a:r>
-              <a:rPr lang="en-US" dirty="0" smtClean="0"/>
-              <a:t>In all the hustle-and-bustle getting ready for </a:t>
-            </a:r>
-            <a:r>
-              <a:rPr lang="en-US" dirty="0" err="1" smtClean="0"/>
-              <a:t>CascadiaRuby</a:t>
-            </a:r>
-            <a:r>
-              <a:rPr lang="en-US" dirty="0" smtClean="0"/>
-              <a:t> and </a:t>
-            </a:r>
-            <a:r>
-              <a:rPr lang="en-US" dirty="0" err="1" smtClean="0"/>
-              <a:t>RubyConf</a:t>
-            </a:r>
-            <a:r>
-              <a:rPr lang="en-US" dirty="0" smtClean="0"/>
-              <a:t> I never got my </a:t>
-            </a:r>
-            <a:r>
-              <a:rPr lang="en-US" dirty="0" err="1" smtClean="0"/>
-              <a:t>DevBootCamp</a:t>
-            </a:r>
-            <a:r>
-              <a:rPr lang="en-US" dirty="0" smtClean="0"/>
-              <a:t> presentation where I wanted it. I had ambitious goals for the presentation. I pitched the idea to several people and they all liked it, but things just weren't coming together. A couple of days out from my speaking gig and I still didn't have a complete presentation and I was starting to get worried. But then I attended </a:t>
-            </a:r>
-            <a:r>
-              <a:rPr lang="en-US" dirty="0" err="1" smtClean="0"/>
-              <a:t>CascadiaRuby</a:t>
-            </a:r>
-            <a:endParaRPr lang="en-US" dirty="0" smtClean="0"/>
-          </a:p>
-          <a:p>
-            <a:endParaRPr lang="en-US" dirty="0" smtClean="0"/>
-          </a:p>
-          <a:p>
-            <a:r>
-              <a:rPr lang="en-US" dirty="0" smtClean="0"/>
-              <a:t>One of the presenters gave a very personal, very powerful, and very moving presentation about lessons he had learned over a career and a computer programmer. He was about my age and had several similar experiences. I related deeply and loved every second of his presentation.</a:t>
-            </a:r>
-          </a:p>
-          <a:p>
-            <a:endParaRPr lang="en-US" dirty="0" smtClean="0"/>
-          </a:p>
-          <a:p>
-            <a:r>
-              <a:rPr lang="en-US" dirty="0" smtClean="0"/>
-              <a:t>When I talked to him about it later he told me he had originally put the presentation together for a group of new programmers just starting out in their careers. A group very similar to the group I was going to be talking to a </a:t>
-            </a:r>
-            <a:r>
-              <a:rPr lang="en-US" dirty="0" err="1" smtClean="0"/>
-              <a:t>DevBootCamp</a:t>
-            </a:r>
-            <a:r>
-              <a:rPr lang="en-US" dirty="0" smtClean="0"/>
-              <a:t>.</a:t>
-            </a:r>
-          </a:p>
-          <a:p>
-            <a:endParaRPr lang="en-US" dirty="0" smtClean="0"/>
-          </a:p>
-          <a:p>
-            <a:r>
-              <a:rPr lang="en-US" dirty="0" smtClean="0"/>
-              <a:t>Honestly, his presentation idea was just much better than mine.</a:t>
-            </a:r>
-          </a:p>
-          <a:p>
-            <a:endParaRPr lang="en-US" dirty="0" smtClean="0"/>
-          </a:p>
-          <a:p>
-            <a:r>
-              <a:rPr lang="en-US" dirty="0" smtClean="0"/>
-              <a:t>&lt;</a:t>
-            </a:r>
-            <a:r>
-              <a:rPr lang="en-US" dirty="0" err="1" smtClean="0"/>
-              <a:t>hr</a:t>
-            </a:r>
-            <a:r>
-              <a:rPr lang="en-US" dirty="0" smtClean="0"/>
-              <a:t> /&gt;</a:t>
-            </a:r>
-          </a:p>
-          <a:p>
-            <a:endParaRPr lang="en-US" dirty="0" smtClean="0"/>
-          </a:p>
-          <a:p>
-            <a:r>
-              <a:rPr lang="en-US" dirty="0" smtClean="0"/>
-              <a:t>* Programmers are smart people by definition</a:t>
-            </a:r>
-          </a:p>
-          <a:p>
-            <a:r>
-              <a:rPr lang="en-US" dirty="0" smtClean="0"/>
-              <a:t>* We also tend to be a clever and creative bunch, too</a:t>
-            </a:r>
-          </a:p>
-          <a:p>
-            <a:r>
-              <a:rPr lang="en-US" dirty="0" smtClean="0"/>
-              <a:t>* We solve problems for a living and we revel in it</a:t>
-            </a:r>
-          </a:p>
-          <a:p>
-            <a:r>
-              <a:rPr lang="en-US" dirty="0" smtClean="0"/>
-              <a:t>* But none of us have a monopoly on intelligence…</a:t>
-            </a:r>
-          </a:p>
-          <a:p>
-            <a:r>
-              <a:rPr lang="en-US" dirty="0" smtClean="0"/>
-              <a:t>* or cleverness…</a:t>
-            </a:r>
-          </a:p>
-          <a:p>
-            <a:r>
-              <a:rPr lang="en-US" dirty="0" smtClean="0"/>
-              <a:t>* or creativity…</a:t>
-            </a:r>
-          </a:p>
-          <a:p>
-            <a:r>
-              <a:rPr lang="en-US" dirty="0" smtClean="0"/>
-              <a:t>* or innovation</a:t>
-            </a:r>
-          </a:p>
-          <a:p>
-            <a:r>
-              <a:rPr lang="en-US" dirty="0" smtClean="0"/>
-              <a:t>* So we need to put our egos aside and recognize the intelligence, cleverness, creativity, and innovation of our peers</a:t>
-            </a:r>
-          </a:p>
-          <a:p>
-            <a:r>
-              <a:rPr lang="en-US" dirty="0" smtClean="0"/>
-              <a:t>* And we need to celebrate diversity</a:t>
-            </a:r>
-          </a:p>
-          <a:p>
-            <a:endParaRPr lang="en-US" dirty="0"/>
-          </a:p>
-        </p:txBody>
-      </p:sp>
-      <p:sp>
-        <p:nvSpPr>
-          <p:cNvPr id="4" name="Slide Number Placeholder 3"/>
-          <p:cNvSpPr>
-            <a:spLocks noGrp="1"/>
-          </p:cNvSpPr>
-          <p:nvPr>
-            <p:ph type="sldNum" sz="quarter" idx="10"/>
-          </p:nvPr>
-        </p:nvSpPr>
-        <p:spPr/>
-        <p:txBody>
-          <a:bodyPr/>
-          <a:lstStyle/>
-          <a:p>
-            <a:fld id="{958C039F-46F0-764D-AFCF-CD78D3455824}" type="slidenum">
-              <a:rPr lang="en-US" smtClean="0"/>
-              <a:t>25</a:t>
-            </a:fld>
-            <a:endParaRPr lang="en-US"/>
-          </a:p>
-        </p:txBody>
-      </p:sp>
-    </p:spTree>
-    <p:extLst>
-      <p:ext uri="{BB962C8B-B14F-4D97-AF65-F5344CB8AC3E}">
-        <p14:creationId xmlns:p14="http://schemas.microsoft.com/office/powerpoint/2010/main" val="87374345"/>
-      </p:ext>
-    </p:extLst>
-  </p:cSld>
-  <p:clrMapOvr>
-    <a:masterClrMapping/>
-  </p:clrMapOvr>
-</p:notes>
-</file>
-
-<file path=ppt/notesSlides/notesSlide26.xml><?xml version="1.0" encoding="utf-8"?>
-<p:notes xmlns:a="http://schemas.openxmlformats.org/drawingml/2006/main" xmlns:r="http://schemas.openxmlformats.org/officeDocument/2006/relationships" xmlns:p="http://schemas.openxmlformats.org/presentationml/2006/main">
-  <p:cSld>
-    <p:spTree>
-      <p:nvGrpSpPr>
-        <p:cNvPr id="1" name=""/>
-        <p:cNvGrpSpPr/>
-        <p:nvPr/>
-      </p:nvGrpSpPr>
-      <p:grpSpPr>
-        <a:xfrm>
-          <a:off x="0" y="0"/>
-          <a:ext cx="0" cy="0"/>
-          <a:chOff x="0" y="0"/>
-          <a:chExt cx="0" cy="0"/>
-        </a:xfrm>
-      </p:grpSpPr>
-      <p:sp>
-        <p:nvSpPr>
-          <p:cNvPr id="2" name="Slide Image Placeholder 1"/>
-          <p:cNvSpPr>
-            <a:spLocks noGrp="1" noRot="1" noChangeAspect="1"/>
-          </p:cNvSpPr>
-          <p:nvPr>
-            <p:ph type="sldImg"/>
-          </p:nvPr>
-        </p:nvSpPr>
-        <p:spPr/>
-      </p:sp>
-      <p:sp>
-        <p:nvSpPr>
-          <p:cNvPr id="3" name="Notes Placeholder 2"/>
-          <p:cNvSpPr>
-            <a:spLocks noGrp="1"/>
-          </p:cNvSpPr>
-          <p:nvPr>
-            <p:ph type="body" idx="1"/>
-          </p:nvPr>
-        </p:nvSpPr>
-        <p:spPr/>
-        <p:txBody>
-          <a:bodyPr/>
-          <a:lstStyle/>
-          <a:p>
-            <a:r>
-              <a:rPr lang="en-US" dirty="0" smtClean="0"/>
-              <a:t>## It's better to excel at Plan B</a:t>
-            </a:r>
-          </a:p>
-          <a:p>
-            <a:endParaRPr lang="en-US" dirty="0" smtClean="0"/>
-          </a:p>
-          <a:p>
-            <a:r>
-              <a:rPr lang="en-US" dirty="0" smtClean="0"/>
-              <a:t>Despite our best intentions, sometimes our ideas just don't work out. And it's easy to get frustrated by that. We become emotionally invested in an idea because it *ours* and because it seemed so *good* at first. In the end that's meaningless. It either works or it doesn't. Sometimes we just need to "throw in the towel" and go with Plan B.</a:t>
-            </a:r>
-          </a:p>
-          <a:p>
-            <a:endParaRPr lang="en-US" dirty="0" smtClean="0"/>
-          </a:p>
-          <a:p>
-            <a:r>
-              <a:rPr lang="en-US" dirty="0" smtClean="0"/>
-              <a:t>This presentation is the perfect example. I really, *really* wanted to present my original idea. It just wouldn't come together. I could have spent the day beating away at PowerPoint and trying to force something to come together. I may have even gotten it together well enough to fool my audience. But I would have known. But when I started working on Plan B things really seemed to fall into place. It just worked. I felt good about it. It seemed right.</a:t>
-            </a:r>
-          </a:p>
-          <a:p>
-            <a:endParaRPr lang="en-US" dirty="0" smtClean="0"/>
-          </a:p>
-          <a:p>
-            <a:r>
-              <a:rPr lang="en-US" dirty="0" smtClean="0"/>
-              <a:t>Only you, my audience, can judge whether or not it worked. maybe it didn't. But I *know* that Plan B worked out much better than Plan A would have.</a:t>
-            </a:r>
-          </a:p>
-          <a:p>
-            <a:endParaRPr lang="en-US" dirty="0" smtClean="0"/>
-          </a:p>
-          <a:p>
-            <a:r>
-              <a:rPr lang="en-US" dirty="0" smtClean="0"/>
-              <a:t>&lt;</a:t>
-            </a:r>
-            <a:r>
-              <a:rPr lang="en-US" dirty="0" err="1" smtClean="0"/>
-              <a:t>hr</a:t>
-            </a:r>
-            <a:r>
-              <a:rPr lang="en-US" dirty="0" smtClean="0"/>
-              <a:t> /&gt;</a:t>
-            </a:r>
-          </a:p>
-          <a:p>
-            <a:endParaRPr lang="en-US" dirty="0" smtClean="0"/>
-          </a:p>
-          <a:p>
-            <a:r>
-              <a:rPr lang="en-US" dirty="0" smtClean="0"/>
-              <a:t>* It's better to excel at Plan B than to be mediocre at Plan A</a:t>
-            </a:r>
-          </a:p>
-          <a:p>
-            <a:endParaRPr lang="en-US" dirty="0"/>
-          </a:p>
-        </p:txBody>
-      </p:sp>
-      <p:sp>
-        <p:nvSpPr>
-          <p:cNvPr id="4" name="Slide Number Placeholder 3"/>
-          <p:cNvSpPr>
-            <a:spLocks noGrp="1"/>
-          </p:cNvSpPr>
-          <p:nvPr>
-            <p:ph type="sldNum" sz="quarter" idx="10"/>
-          </p:nvPr>
-        </p:nvSpPr>
-        <p:spPr/>
-        <p:txBody>
-          <a:bodyPr/>
-          <a:lstStyle/>
-          <a:p>
-            <a:fld id="{958C039F-46F0-764D-AFCF-CD78D3455824}" type="slidenum">
-              <a:rPr lang="en-US" smtClean="0"/>
-              <a:t>26</a:t>
-            </a:fld>
-            <a:endParaRPr lang="en-US"/>
-          </a:p>
-        </p:txBody>
-      </p:sp>
-    </p:spTree>
-    <p:extLst>
-      <p:ext uri="{BB962C8B-B14F-4D97-AF65-F5344CB8AC3E}">
-        <p14:creationId xmlns:p14="http://schemas.microsoft.com/office/powerpoint/2010/main" val="3908768357"/>
-      </p:ext>
-    </p:extLst>
-  </p:cSld>
-  <p:clrMapOvr>
-    <a:masterClrMapping/>
-  </p:clrMapOvr>
-</p:notes>
-</file>
-
-<file path=ppt/notesSlides/notesSlide27.xml><?xml version="1.0" encoding="utf-8"?>
-<p:notes xmlns:a="http://schemas.openxmlformats.org/drawingml/2006/main" xmlns:r="http://schemas.openxmlformats.org/officeDocument/2006/relationships" xmlns:p="http://schemas.openxmlformats.org/presentationml/2006/main">
-  <p:cSld>
-    <p:spTree>
-      <p:nvGrpSpPr>
-        <p:cNvPr id="1" name=""/>
-        <p:cNvGrpSpPr/>
-        <p:nvPr/>
-      </p:nvGrpSpPr>
-      <p:grpSpPr>
-        <a:xfrm>
-          <a:off x="0" y="0"/>
-          <a:ext cx="0" cy="0"/>
-          <a:chOff x="0" y="0"/>
-          <a:chExt cx="0" cy="0"/>
-        </a:xfrm>
-      </p:grpSpPr>
-      <p:sp>
-        <p:nvSpPr>
-          <p:cNvPr id="2" name="Slide Image Placeholder 1"/>
-          <p:cNvSpPr>
-            <a:spLocks noGrp="1" noRot="1" noChangeAspect="1"/>
-          </p:cNvSpPr>
-          <p:nvPr>
-            <p:ph type="sldImg"/>
-          </p:nvPr>
-        </p:nvSpPr>
-        <p:spPr/>
-      </p:sp>
-      <p:sp>
-        <p:nvSpPr>
-          <p:cNvPr id="3" name="Notes Placeholder 2"/>
-          <p:cNvSpPr>
-            <a:spLocks noGrp="1"/>
-          </p:cNvSpPr>
-          <p:nvPr>
-            <p:ph type="body" idx="1"/>
-          </p:nvPr>
-        </p:nvSpPr>
-        <p:spPr/>
-        <p:txBody>
-          <a:bodyPr/>
-          <a:lstStyle/>
-          <a:p>
-            <a:r>
-              <a:rPr lang="en-US" dirty="0" smtClean="0"/>
-              <a:t>## Do what you love, love what you do</a:t>
-            </a:r>
-          </a:p>
-          <a:p>
-            <a:endParaRPr lang="en-US" dirty="0" smtClean="0"/>
-          </a:p>
-          <a:p>
-            <a:r>
-              <a:rPr lang="en-US" dirty="0" smtClean="0"/>
-              <a:t>My parting advice to you can be summed up in one word: *Love*</a:t>
-            </a:r>
-          </a:p>
-          <a:p>
-            <a:endParaRPr lang="en-US" dirty="0" smtClean="0"/>
-          </a:p>
-          <a:p>
-            <a:r>
-              <a:rPr lang="en-US" dirty="0" smtClean="0"/>
-              <a:t>* Do what you love</a:t>
-            </a:r>
-          </a:p>
-          <a:p>
-            <a:r>
-              <a:rPr lang="en-US" dirty="0" smtClean="0"/>
-              <a:t>* Love what you do</a:t>
-            </a:r>
-          </a:p>
-          <a:p>
-            <a:r>
-              <a:rPr lang="en-US" dirty="0" smtClean="0"/>
-              <a:t>* Love your life</a:t>
-            </a:r>
-          </a:p>
-          <a:p>
-            <a:r>
-              <a:rPr lang="en-US" dirty="0" smtClean="0"/>
-              <a:t>* Love your family</a:t>
-            </a:r>
-          </a:p>
-          <a:p>
-            <a:r>
-              <a:rPr lang="en-US" dirty="0" smtClean="0"/>
-              <a:t>* Love your job</a:t>
-            </a:r>
-          </a:p>
-          <a:p>
-            <a:r>
-              <a:rPr lang="en-US" dirty="0" smtClean="0"/>
-              <a:t>* Love your life</a:t>
-            </a:r>
-          </a:p>
-          <a:p>
-            <a:endParaRPr lang="en-US" dirty="0"/>
-          </a:p>
-        </p:txBody>
-      </p:sp>
-      <p:sp>
-        <p:nvSpPr>
-          <p:cNvPr id="4" name="Slide Number Placeholder 3"/>
-          <p:cNvSpPr>
-            <a:spLocks noGrp="1"/>
-          </p:cNvSpPr>
-          <p:nvPr>
-            <p:ph type="sldNum" sz="quarter" idx="10"/>
-          </p:nvPr>
-        </p:nvSpPr>
-        <p:spPr/>
-        <p:txBody>
-          <a:bodyPr/>
-          <a:lstStyle/>
-          <a:p>
-            <a:fld id="{958C039F-46F0-764D-AFCF-CD78D3455824}" type="slidenum">
-              <a:rPr lang="en-US" smtClean="0"/>
-              <a:t>27</a:t>
-            </a:fld>
-            <a:endParaRPr lang="en-US"/>
-          </a:p>
-        </p:txBody>
-      </p:sp>
-    </p:spTree>
-    <p:extLst>
-      <p:ext uri="{BB962C8B-B14F-4D97-AF65-F5344CB8AC3E}">
-        <p14:creationId xmlns:p14="http://schemas.microsoft.com/office/powerpoint/2010/main" val="3962093413"/>
-      </p:ext>
-    </p:extLst>
-  </p:cSld>
-  <p:clrMapOvr>
-    <a:masterClrMapping/>
-  </p:clrMapOvr>
-</p:notes>
-</file>
-
-<file path=ppt/notesSlides/notesSlide28.xml><?xml version="1.0" encoding="utf-8"?>
-<p:notes xmlns:a="http://schemas.openxmlformats.org/drawingml/2006/main" xmlns:r="http://schemas.openxmlformats.org/officeDocument/2006/relationships" xmlns:p="http://schemas.openxmlformats.org/presentationml/2006/main">
-  <p:cSld>
-    <p:spTree>
-      <p:nvGrpSpPr>
-        <p:cNvPr id="1" name=""/>
-        <p:cNvGrpSpPr/>
-        <p:nvPr/>
-      </p:nvGrpSpPr>
-      <p:grpSpPr>
-        <a:xfrm>
-          <a:off x="0" y="0"/>
-          <a:ext cx="0" cy="0"/>
-          <a:chOff x="0" y="0"/>
-          <a:chExt cx="0" cy="0"/>
-        </a:xfrm>
-      </p:grpSpPr>
-      <p:sp>
-        <p:nvSpPr>
-          <p:cNvPr id="2" name="Slide Image Placeholder 1"/>
-          <p:cNvSpPr>
-            <a:spLocks noGrp="1" noRot="1" noChangeAspect="1"/>
-          </p:cNvSpPr>
-          <p:nvPr>
-            <p:ph type="sldImg"/>
-          </p:nvPr>
-        </p:nvSpPr>
-        <p:spPr/>
-      </p:sp>
-      <p:sp>
-        <p:nvSpPr>
-          <p:cNvPr id="3" name="Notes Placeholder 2"/>
-          <p:cNvSpPr>
-            <a:spLocks noGrp="1"/>
-          </p:cNvSpPr>
-          <p:nvPr>
-            <p:ph type="body" idx="1"/>
-          </p:nvPr>
-        </p:nvSpPr>
-        <p:spPr/>
-        <p:txBody>
-          <a:bodyPr/>
-          <a:lstStyle/>
-          <a:p>
-            <a:r>
-              <a:rPr lang="en-US" dirty="0" smtClean="0"/>
-              <a:t>## This job is not about</a:t>
-            </a:r>
-          </a:p>
-          <a:p>
-            <a:endParaRPr lang="en-US" dirty="0" smtClean="0"/>
-          </a:p>
-          <a:p>
-            <a:r>
-              <a:rPr lang="en-US" dirty="0" smtClean="0"/>
-              <a:t>And always remember:</a:t>
-            </a:r>
-          </a:p>
-          <a:p>
-            <a:endParaRPr lang="en-US" dirty="0" smtClean="0"/>
-          </a:p>
-          <a:p>
-            <a:r>
-              <a:rPr lang="en-US" dirty="0" smtClean="0"/>
-              <a:t>* This job is not about the code</a:t>
-            </a:r>
-          </a:p>
-          <a:p>
-            <a:r>
-              <a:rPr lang="en-US" dirty="0" smtClean="0"/>
-              <a:t>* This job is not about the tech</a:t>
-            </a:r>
-          </a:p>
-          <a:p>
-            <a:r>
-              <a:rPr lang="en-US" dirty="0" smtClean="0"/>
-              <a:t>* This job is not about the problem</a:t>
-            </a:r>
-          </a:p>
-          <a:p>
-            <a:r>
-              <a:rPr lang="en-US" dirty="0" smtClean="0"/>
-              <a:t>* This job is not about the solution</a:t>
-            </a:r>
-          </a:p>
-          <a:p>
-            <a:endParaRPr lang="en-US" dirty="0"/>
-          </a:p>
-        </p:txBody>
-      </p:sp>
-      <p:sp>
-        <p:nvSpPr>
-          <p:cNvPr id="4" name="Slide Number Placeholder 3"/>
-          <p:cNvSpPr>
-            <a:spLocks noGrp="1"/>
-          </p:cNvSpPr>
-          <p:nvPr>
-            <p:ph type="sldNum" sz="quarter" idx="10"/>
-          </p:nvPr>
-        </p:nvSpPr>
-        <p:spPr/>
-        <p:txBody>
-          <a:bodyPr/>
-          <a:lstStyle/>
-          <a:p>
-            <a:fld id="{958C039F-46F0-764D-AFCF-CD78D3455824}" type="slidenum">
-              <a:rPr lang="en-US" smtClean="0"/>
-              <a:t>28</a:t>
-            </a:fld>
-            <a:endParaRPr lang="en-US"/>
-          </a:p>
-        </p:txBody>
-      </p:sp>
-    </p:spTree>
-    <p:extLst>
-      <p:ext uri="{BB962C8B-B14F-4D97-AF65-F5344CB8AC3E}">
-        <p14:creationId xmlns:p14="http://schemas.microsoft.com/office/powerpoint/2010/main" val="3879776579"/>
-      </p:ext>
-    </p:extLst>
-  </p:cSld>
-  <p:clrMapOvr>
-    <a:masterClrMapping/>
-  </p:clrMapOvr>
-</p:notes>
-</file>
-
-<file path=ppt/notesSlides/notesSlide29.xml><?xml version="1.0" encoding="utf-8"?>
-<p:notes xmlns:a="http://schemas.openxmlformats.org/drawingml/2006/main" xmlns:r="http://schemas.openxmlformats.org/officeDocument/2006/relationships" xmlns:p="http://schemas.openxmlformats.org/presentationml/2006/main">
-  <p:cSld>
-    <p:spTree>
-      <p:nvGrpSpPr>
-        <p:cNvPr id="1" name=""/>
-        <p:cNvGrpSpPr/>
-        <p:nvPr/>
-      </p:nvGrpSpPr>
-      <p:grpSpPr>
-        <a:xfrm>
-          <a:off x="0" y="0"/>
-          <a:ext cx="0" cy="0"/>
-          <a:chOff x="0" y="0"/>
-          <a:chExt cx="0" cy="0"/>
-        </a:xfrm>
-      </p:grpSpPr>
-      <p:sp>
-        <p:nvSpPr>
-          <p:cNvPr id="2" name="Slide Image Placeholder 1"/>
-          <p:cNvSpPr>
-            <a:spLocks noGrp="1" noRot="1" noChangeAspect="1"/>
-          </p:cNvSpPr>
-          <p:nvPr>
-            <p:ph type="sldImg"/>
-          </p:nvPr>
-        </p:nvSpPr>
-        <p:spPr/>
-      </p:sp>
-      <p:sp>
-        <p:nvSpPr>
-          <p:cNvPr id="3" name="Notes Placeholder 2"/>
-          <p:cNvSpPr>
-            <a:spLocks noGrp="1"/>
-          </p:cNvSpPr>
-          <p:nvPr>
-            <p:ph type="body" idx="1"/>
-          </p:nvPr>
-        </p:nvSpPr>
-        <p:spPr/>
-        <p:txBody>
-          <a:bodyPr/>
-          <a:lstStyle/>
-          <a:p>
-            <a:r>
-              <a:rPr lang="en-US" dirty="0" smtClean="0"/>
               <a:t>## It's about the people</a:t>
             </a:r>
           </a:p>
@@ -4078,7 +2894,7 @@
           <a:p>
             <a:fld id="{958C039F-46F0-764D-AFCF-CD78D3455824}" type="slidenum">
               <a:rPr lang="en-US" smtClean="0"/>
-              <a:t>29</a:t>
+              <a:t>22</a:t>
             </a:fld>
             <a:endParaRPr lang="en-US"/>
           </a:p>
@@ -4197,12 +3013,12 @@
               <a:t>* One day I said "Sgt., if I </a:t>
             </a:r>
             <a:r>
-              <a:rPr lang="en-US" dirty="0" err="1" smtClean="0"/>
-              <a:t>didn'y</a:t>
-            </a:r>
-            <a:r>
-              <a:rPr lang="en-US" dirty="0" smtClean="0"/>
-              <a:t> know better I would think you are picking on me."</a:t>
+              <a:rPr lang="en-US" dirty="0" smtClean="0"/>
+              <a:t>didn’t </a:t>
+            </a:r>
+            <a:r>
+              <a:rPr lang="en-US" dirty="0" smtClean="0"/>
+              <a:t>know better I would think you are picking on me."</a:t>
             </a:r>
           </a:p>
           <a:p>
@@ -4408,12 +3224,12 @@
               <a:t>The instructor look at me and said: "Jerry, you still don't get it. This isn't a tactical </a:t>
             </a:r>
             <a:r>
-              <a:rPr lang="en-US" dirty="0" err="1" smtClean="0"/>
-              <a:t>comabt</a:t>
-            </a:r>
-            <a:r>
-              <a:rPr lang="en-US" dirty="0" smtClean="0"/>
-              <a:t> course. This is a *leadership* course."</a:t>
+              <a:rPr lang="en-US" dirty="0" smtClean="0"/>
+              <a:t>combat course</a:t>
+            </a:r>
+            <a:r>
+              <a:rPr lang="en-US" dirty="0" smtClean="0"/>
+              <a:t>. This is a *leadership* course."</a:t>
             </a:r>
           </a:p>
           <a:p>
@@ -4692,12 +3508,12 @@
               <a:t>"You, on the other hand," he continued (still at very high volume) "</a:t>
             </a:r>
             <a:r>
-              <a:rPr lang="en-US" dirty="0" err="1" smtClean="0"/>
-              <a:t>bith</a:t>
-            </a:r>
-            <a:r>
-              <a:rPr lang="en-US" dirty="0" smtClean="0"/>
-              <a:t> and whine and moan all the time. For all your talent you're never happy. You stay out all night whenever we're about to get underway and navigate us out of the harbor </a:t>
+              <a:rPr lang="en-US" dirty="0" smtClean="0"/>
+              <a:t>bitch </a:t>
+            </a:r>
+            <a:r>
+              <a:rPr lang="en-US" dirty="0" smtClean="0"/>
+              <a:t>and whine and moan all the time. For all your talent you're never happy. You stay out all night whenever we're about to get underway and navigate us out of the harbor </a:t>
             </a:r>
             <a:r>
               <a:rPr lang="en-US" dirty="0" err="1" smtClean="0"/>
@@ -5189,12 +4005,12 @@
               <a:t>I had an opportunity to sit down with the director from a new project. The managers from my project recommended me personally and were as supportive and I could have ever asked them to be. So I'm in this meeting and this director tells me he's ready to hire me today. He's impressed with everything I've done, felt we got along very </a:t>
             </a:r>
             <a:r>
-              <a:rPr lang="en-US" dirty="0" err="1" smtClean="0"/>
-              <a:t>weel</a:t>
-            </a:r>
-            <a:r>
-              <a:rPr lang="en-US" dirty="0" smtClean="0"/>
-              <a:t>, thought I would be a great asset, and wanted me on board ASAP to help him get the project off the ground. There was just one catch. He wanted me to drop out of school.</a:t>
+              <a:rPr lang="en-US" dirty="0" smtClean="0"/>
+              <a:t>well, </a:t>
+            </a:r>
+            <a:r>
+              <a:rPr lang="en-US" dirty="0" smtClean="0"/>
+              <a:t>thought I would be a great asset, and wanted me on board ASAP to help him get the project off the ground. There was just one catch. He wanted me to drop out of school.</a:t>
             </a:r>
           </a:p>
           <a:p>
@@ -5346,16 +4162,34 @@
           <a:p>
             <a:r>
               <a:rPr lang="en-US" dirty="0" smtClean="0"/>
-              <a:t>## Bad things *will* happen to you</a:t>
-            </a:r>
-          </a:p>
-          <a:p>
-            <a:endParaRPr lang="en-US" dirty="0" smtClean="0"/>
-          </a:p>
-          <a:p>
-            <a:r>
-              <a:rPr lang="en-US" dirty="0" smtClean="0"/>
-              <a:t>When I was 26 years old my father passed away. He had a heart attack late on a Sunday evening and he was gone by the weekend. My relationship with my father was a complicated one. The kind of relationship I normally only talk about with my therapist at ridiculous cost to my insurance company. Be he was my father. He was the only family I had in Denver. My tech career was just taking off and he was proud of what I was accomplishing. And just like that he was gone.</a:t>
+              <a:t>## No one wants to do bad work</a:t>
+            </a:r>
+          </a:p>
+          <a:p>
+            <a:endParaRPr lang="en-US" dirty="0" smtClean="0"/>
+          </a:p>
+          <a:p>
+            <a:r>
+              <a:rPr lang="en-US" dirty="0" smtClean="0"/>
+              <a:t>A few years later I was working as a web programmer for a dot-com startup (back then we called it "webmaster"--yes, I am *that* old). The dot-com boom was in full swing, I was making good money, I was finishing up my first masters degree, I had a fat stack of (now worthless) stock options. Everything was coming together.</a:t>
+            </a:r>
+          </a:p>
+          <a:p>
+            <a:endParaRPr lang="en-US" dirty="0" smtClean="0"/>
+          </a:p>
+          <a:p>
+            <a:r>
+              <a:rPr lang="en-US" dirty="0" smtClean="0"/>
+              <a:t>So I'm back to work as the manager of the development team and one of my employees isn't meeting expectations. She was hired as an HTML author (that was a real job back then) but she really wanted to be a programmer. I hired her knowing that was her goal but she took the job knowing she didn't yet have the skills. We both knew she wasn't living up to her potential and we both knew why. Bus as the boss I had to make a decision. So I used her next performance review to let her make that decision.</a:t>
+            </a:r>
+          </a:p>
+          <a:p>
+            <a:endParaRPr lang="en-US" dirty="0" smtClean="0"/>
+          </a:p>
+          <a:p>
+            <a:r>
+              <a:rPr lang="en-US" dirty="0" smtClean="0"/>
+              <a:t>I offered her two choices. I put two job "offers" in front of her. One was for "Sr. HTML Author" and the other was for "Jr. Programmer". Both had the same salary (the same thing she was currently making). One job clearly had *no* programming responsibilities. The other came with a 6-month probation period in which I could fire her without question if she didn't meet several expectations explicitly detailed in the offer. One offer entailed risk and the other didn't. I asked he to come back tomorrow with a signature on one and to throw the other away.</a:t>
             </a:r>
           </a:p>
           <a:p>
@@ -5381,37 +4215,31 @@
           <a:p>
             <a:r>
               <a:rPr lang="en-US" dirty="0" smtClean="0"/>
-              <a:t>* Bad things *will* happen to you</a:t>
-            </a:r>
-          </a:p>
-          <a:p>
-            <a:r>
-              <a:rPr lang="en-US" dirty="0" smtClean="0"/>
-              <a:t>* It's just an unfortunate reality that none of us will escape</a:t>
-            </a:r>
-          </a:p>
-          <a:p>
-            <a:r>
-              <a:rPr lang="en-US" dirty="0" smtClean="0"/>
-              <a:t>* But you will survive</a:t>
-            </a:r>
-          </a:p>
-          <a:p>
-            <a:r>
-              <a:rPr lang="en-US" dirty="0" smtClean="0"/>
-              <a:t>* I may take effort, it may take years, and in some extreme cases it may take professional help</a:t>
-            </a:r>
-          </a:p>
-          <a:p>
-            <a:r>
-              <a:rPr lang="en-US" dirty="0" smtClean="0"/>
-              <a:t>* But you are far more resilient than you may realize</a:t>
-            </a:r>
-          </a:p>
-          <a:p>
-            <a:r>
-              <a:rPr lang="en-US" dirty="0" smtClean="0"/>
-              <a:t>* And things will get better</a:t>
+              <a:t>* When someone isn't getting the job done there is always a reason</a:t>
+            </a:r>
+          </a:p>
+          <a:p>
+            <a:r>
+              <a:rPr lang="en-US" dirty="0" smtClean="0"/>
+              <a:t>* Generally it isn't that the person is incapable of doing the job (thought occasionally it is)</a:t>
+            </a:r>
+          </a:p>
+          <a:p>
+            <a:r>
+              <a:rPr lang="en-US" dirty="0" smtClean="0"/>
+              <a:t>* People generally want to do good work</a:t>
+            </a:r>
+          </a:p>
+          <a:p>
+            <a:r>
+              <a:rPr lang="en-US" dirty="0" smtClean="0"/>
+              <a:t>* The problem is never as simple as "performance"</a:t>
+            </a:r>
+          </a:p>
+          <a:p>
+            <a:r>
+              <a:rPr lang="en-US" dirty="0" smtClean="0"/>
+              <a:t>* Find the root of the problem and solve it</a:t>
             </a:r>
           </a:p>
           <a:p>
@@ -5445,7 +4273,7 @@
     </p:spTree>
     <p:extLst>
       <p:ext uri="{BB962C8B-B14F-4D97-AF65-F5344CB8AC3E}">
-        <p14:creationId xmlns:p14="http://schemas.microsoft.com/office/powerpoint/2010/main" val="2329720967"/>
+        <p14:creationId xmlns:p14="http://schemas.microsoft.com/office/powerpoint/2010/main" val="4251400171"/>
       </p:ext>
     </p:extLst>
   </p:cSld>
@@ -5515,7 +4343,7 @@
             <a:fld id="{2233D26B-DFC2-4248-8ED0-AD3E108CBDD7}" type="datetime1">
               <a:rPr lang="en-US" smtClean="0"/>
               <a:pPr/>
-              <a:t>10/24/13</a:t>
+              <a:t>9/22/14</a:t>
             </a:fld>
             <a:endParaRPr lang="en-US"/>
           </a:p>
@@ -5833,7 +4661,7 @@
             <a:fld id="{E694C003-38E8-486A-9BFD-47E55D87241C}" type="datetime1">
               <a:rPr lang="en-US" smtClean="0"/>
               <a:pPr/>
-              <a:t>10/24/13</a:t>
+              <a:t>9/22/14</a:t>
             </a:fld>
             <a:endParaRPr lang="en-US"/>
           </a:p>
@@ -6010,7 +4838,7 @@
             <a:fld id="{E059EAA3-934B-41DB-B3B1-806F4BE5CC37}" type="datetime1">
               <a:rPr lang="en-US" smtClean="0"/>
               <a:pPr/>
-              <a:t>10/24/13</a:t>
+              <a:t>9/22/14</a:t>
             </a:fld>
             <a:endParaRPr lang="en-US"/>
           </a:p>
@@ -6130,7 +4958,7 @@
             <a:fld id="{8F97F932-D99A-4087-BFB1-EA42FAFC8D2C}" type="datetime1">
               <a:rPr lang="en-US" smtClean="0"/>
               <a:pPr/>
-              <a:t>10/24/13</a:t>
+              <a:t>9/22/14</a:t>
             </a:fld>
             <a:endParaRPr lang="en-US"/>
           </a:p>
@@ -6430,7 +5258,7 @@
             <a:fld id="{79C96367-2F2B-4F6E-ACF4-15FA13738E10}" type="datetime1">
               <a:rPr lang="en-US" smtClean="0"/>
               <a:pPr/>
-              <a:t>10/24/13</a:t>
+              <a:t>9/22/14</a:t>
             </a:fld>
             <a:endParaRPr lang="en-US"/>
           </a:p>
@@ -6725,7 +5553,7 @@
             <a:fld id="{8FB3498D-21C7-408B-8EF5-5B55DEF0BFD5}" type="datetime1">
               <a:rPr lang="en-US" smtClean="0"/>
               <a:pPr/>
-              <a:t>10/24/13</a:t>
+              <a:t>9/22/14</a:t>
             </a:fld>
             <a:endParaRPr lang="en-US"/>
           </a:p>
@@ -7155,7 +5983,7 @@
             <a:fld id="{84DB246E-8FD1-42FF-94A4-E4133095C37A}" type="datetime1">
               <a:rPr lang="en-US" smtClean="0"/>
               <a:pPr/>
-              <a:t>10/24/13</a:t>
+              <a:t>9/22/14</a:t>
             </a:fld>
             <a:endParaRPr lang="en-US"/>
           </a:p>
@@ -7275,7 +6103,7 @@
             <a:fld id="{A93939D4-B818-4372-B1EE-7CB6D5BBC74A}" type="datetime1">
               <a:rPr lang="en-US" smtClean="0"/>
               <a:pPr/>
-              <a:t>10/24/13</a:t>
+              <a:t>9/22/14</a:t>
             </a:fld>
             <a:endParaRPr lang="en-US"/>
           </a:p>
@@ -7367,7 +6195,7 @@
             <a:fld id="{2F35E438-4D0D-4834-B658-A90420491D98}" type="datetime1">
               <a:rPr lang="en-US" smtClean="0"/>
               <a:pPr/>
-              <a:t>10/24/13</a:t>
+              <a:t>9/22/14</a:t>
             </a:fld>
             <a:endParaRPr lang="en-US"/>
           </a:p>
@@ -7619,7 +6447,7 @@
             <a:fld id="{76F8ADFA-7142-4015-85E6-1712F15FA709}" type="datetime1">
               <a:rPr lang="en-US" smtClean="0"/>
               <a:pPr/>
-              <a:t>10/24/13</a:t>
+              <a:t>9/22/14</a:t>
             </a:fld>
             <a:endParaRPr lang="en-US"/>
           </a:p>
@@ -8137,7 +6965,7 @@
             <a:fld id="{34A581E0-D653-4D78-A48F-41D80498BC7E}" type="datetime1">
               <a:rPr lang="en-US" smtClean="0"/>
               <a:pPr/>
-              <a:t>10/24/13</a:t>
+              <a:t>9/22/14</a:t>
             </a:fld>
             <a:endParaRPr lang="en-US"/>
           </a:p>
@@ -8369,7 +7197,7 @@
             <a:fld id="{8B3AFFF1-9C47-49F0-AE12-AF188F3F4E82}" type="datetime1">
               <a:rPr lang="en-US" smtClean="0"/>
               <a:pPr/>
-              <a:t>10/24/13</a:t>
+              <a:t>9/22/14</a:t>
             </a:fld>
             <a:endParaRPr lang="en-US" dirty="0"/>
           </a:p>
@@ -9009,14 +7837,14 @@
           <a:p>
             <a:r>
               <a:rPr lang="en-US" dirty="0" smtClean="0"/>
-              <a:t>Learn from your mistakes, grow from them,</a:t>
+              <a:t>It’s great to take pride in your work but</a:t>
             </a:r>
             <a:br>
               <a:rPr lang="en-US" dirty="0" smtClean="0"/>
             </a:br>
             <a:r>
               <a:rPr lang="en-US" dirty="0" smtClean="0"/>
-              <a:t>but don’t carry the regret with you forever.</a:t>
+              <a:t>don’t confuse your work with your own self-worth.</a:t>
             </a:r>
             <a:endParaRPr lang="en-US" dirty="0"/>
           </a:p>
@@ -9039,7 +7867,15 @@
           <a:p>
             <a:r>
               <a:rPr lang="en-US" dirty="0" smtClean="0"/>
-              <a:t>You Will Regret Some Decisions </a:t>
+              <a:t>You Are </a:t>
+            </a:r>
+            <a:r>
+              <a:rPr lang="en-US" i="1" dirty="0" smtClean="0"/>
+              <a:t>Not</a:t>
+            </a:r>
+            <a:r>
+              <a:rPr lang="en-US" dirty="0" smtClean="0"/>
+              <a:t> Your Code</a:t>
             </a:r>
             <a:endParaRPr lang="en-US" dirty="0"/>
           </a:p>
@@ -9048,7 +7884,7 @@
     </p:spTree>
     <p:extLst>
       <p:ext uri="{BB962C8B-B14F-4D97-AF65-F5344CB8AC3E}">
-        <p14:creationId xmlns:p14="http://schemas.microsoft.com/office/powerpoint/2010/main" val="3804243288"/>
+        <p14:creationId xmlns:p14="http://schemas.microsoft.com/office/powerpoint/2010/main" val="2020340630"/>
       </p:ext>
     </p:extLst>
   </p:cSld>
@@ -9097,14 +7933,7 @@
           <a:p>
             <a:r>
               <a:rPr lang="en-US" dirty="0" smtClean="0"/>
-              <a:t>When someone isn’t getting the job done there is a reason.</a:t>
-            </a:r>
-            <a:br>
-              <a:rPr lang="en-US" dirty="0" smtClean="0"/>
-            </a:br>
-            <a:r>
-              <a:rPr lang="en-US" dirty="0" smtClean="0"/>
-              <a:t>Find the reason and address the real problem.</a:t>
+              <a:t>Passion for your work is no substitute for love.</a:t>
             </a:r>
             <a:endParaRPr lang="en-US" dirty="0"/>
           </a:p>
@@ -9127,7 +7956,7 @@
           <a:p>
             <a:r>
               <a:rPr lang="en-US" dirty="0" smtClean="0"/>
-              <a:t>No One Wants To Do Bad Work</a:t>
+              <a:t>Your Job Is Not Your Life</a:t>
             </a:r>
             <a:endParaRPr lang="en-US" dirty="0"/>
           </a:p>
@@ -9136,7 +7965,7 @@
     </p:spTree>
     <p:extLst>
       <p:ext uri="{BB962C8B-B14F-4D97-AF65-F5344CB8AC3E}">
-        <p14:creationId xmlns:p14="http://schemas.microsoft.com/office/powerpoint/2010/main" val="2740943154"/>
+        <p14:creationId xmlns:p14="http://schemas.microsoft.com/office/powerpoint/2010/main" val="2022144273"/>
       </p:ext>
     </p:extLst>
   </p:cSld>
@@ -9185,7 +8014,14 @@
           <a:p>
             <a:r>
               <a:rPr lang="en-US" dirty="0" smtClean="0"/>
-              <a:t>The unknown is scary, but fear shouldn’t keep you in a bad situation.</a:t>
+              <a:t>Teams are made of individuals and each individual is important,</a:t>
+            </a:r>
+            <a:br>
+              <a:rPr lang="en-US" dirty="0" smtClean="0"/>
+            </a:br>
+            <a:r>
+              <a:rPr lang="en-US" dirty="0" smtClean="0"/>
+              <a:t>but teams succeed and fail as a whole.</a:t>
             </a:r>
             <a:endParaRPr lang="en-US" dirty="0"/>
           </a:p>
@@ -9207,8 +8043,8 @@
           <a:lstStyle/>
           <a:p>
             <a:r>
-              <a:rPr lang="en-US" dirty="0" smtClean="0"/>
-              <a:t>Recognize When It’s Time To Go</a:t>
+              <a:rPr lang="en-US" dirty="0"/>
+              <a:t>Good teams stand together</a:t>
             </a:r>
             <a:endParaRPr lang="en-US" dirty="0"/>
           </a:p>
@@ -9217,7 +8053,7 @@
     </p:spTree>
     <p:extLst>
       <p:ext uri="{BB962C8B-B14F-4D97-AF65-F5344CB8AC3E}">
-        <p14:creationId xmlns:p14="http://schemas.microsoft.com/office/powerpoint/2010/main" val="3122861188"/>
+        <p14:creationId xmlns:p14="http://schemas.microsoft.com/office/powerpoint/2010/main" val="2709397366"/>
       </p:ext>
     </p:extLst>
   </p:cSld>
@@ -9266,9 +8102,15 @@
           <a:p>
             <a:r>
               <a:rPr lang="en-US" dirty="0" smtClean="0"/>
-              <a:t>Some people are not a good fit. Some jobs are not a good fit.</a:t>
-            </a:r>
-            <a:endParaRPr lang="en-US" dirty="0"/>
+              <a:t>Understanding why things went wrong is important,</a:t>
+            </a:r>
+            <a:br>
+              <a:rPr lang="en-US" dirty="0" smtClean="0"/>
+            </a:br>
+            <a:r>
+              <a:rPr lang="en-US" dirty="0" smtClean="0"/>
+              <a:t>but fixing the problem is what really matters.</a:t>
+            </a:r>
           </a:p>
         </p:txBody>
       </p:sp>
@@ -9289,7 +8131,7 @@
           <a:p>
             <a:r>
               <a:rPr lang="en-US" dirty="0" smtClean="0"/>
-              <a:t>Business Isn’t Personal</a:t>
+              <a:t>Offer Solutions, Not Excuses</a:t>
             </a:r>
             <a:endParaRPr lang="en-US" dirty="0"/>
           </a:p>
@@ -9298,7 +8140,7 @@
     </p:spTree>
     <p:extLst>
       <p:ext uri="{BB962C8B-B14F-4D97-AF65-F5344CB8AC3E}">
-        <p14:creationId xmlns:p14="http://schemas.microsoft.com/office/powerpoint/2010/main" val="2756020267"/>
+        <p14:creationId xmlns:p14="http://schemas.microsoft.com/office/powerpoint/2010/main" val="1931047125"/>
       </p:ext>
     </p:extLst>
   </p:cSld>
@@ -9347,7 +8189,15 @@
           <a:p>
             <a:r>
               <a:rPr lang="en-US" dirty="0" smtClean="0"/>
-              <a:t>Never forget that employees are human beings.</a:t>
+              <a:t>Leave things better than </a:t>
+            </a:r>
+            <a:r>
+              <a:rPr lang="en-US" dirty="0" smtClean="0"/>
+              <a:t>you </a:t>
+            </a:r>
+            <a:r>
+              <a:rPr lang="en-US" dirty="0" smtClean="0"/>
+              <a:t>found them.</a:t>
             </a:r>
             <a:endParaRPr lang="en-US" dirty="0"/>
           </a:p>
@@ -9370,7 +8220,7 @@
           <a:p>
             <a:r>
               <a:rPr lang="en-US" dirty="0" smtClean="0"/>
-              <a:t>But How You Conduct Business Is</a:t>
+              <a:t>Failures Are Also Opportunities</a:t>
             </a:r>
             <a:endParaRPr lang="en-US" dirty="0"/>
           </a:p>
@@ -9379,7 +8229,7 @@
     </p:spTree>
     <p:extLst>
       <p:ext uri="{BB962C8B-B14F-4D97-AF65-F5344CB8AC3E}">
-        <p14:creationId xmlns:p14="http://schemas.microsoft.com/office/powerpoint/2010/main" val="2199114344"/>
+        <p14:creationId xmlns:p14="http://schemas.microsoft.com/office/powerpoint/2010/main" val="2676105984"/>
       </p:ext>
     </p:extLst>
   </p:cSld>
@@ -9428,14 +8278,14 @@
           <a:p>
             <a:r>
               <a:rPr lang="en-US" dirty="0" smtClean="0"/>
-              <a:t>It’s great to take pride in your work but</a:t>
+              <a:t>Good leaders get credit for high performance teams,</a:t>
             </a:r>
             <a:br>
               <a:rPr lang="en-US" dirty="0" smtClean="0"/>
             </a:br>
             <a:r>
               <a:rPr lang="en-US" dirty="0" smtClean="0"/>
-              <a:t>don’t confuse your work with your own self-worth.</a:t>
+              <a:t>they don’t need to take credit for individual achievements.</a:t>
             </a:r>
             <a:endParaRPr lang="en-US" dirty="0"/>
           </a:p>
@@ -9458,15 +8308,7 @@
           <a:p>
             <a:r>
               <a:rPr lang="en-US" dirty="0" smtClean="0"/>
-              <a:t>You Are </a:t>
-            </a:r>
-            <a:r>
-              <a:rPr lang="en-US" i="1" dirty="0" smtClean="0"/>
-              <a:t>Not</a:t>
-            </a:r>
-            <a:r>
-              <a:rPr lang="en-US" dirty="0" smtClean="0"/>
-              <a:t> Your Code</a:t>
+              <a:t>My Team Gets Credit, I Get Blame</a:t>
             </a:r>
             <a:endParaRPr lang="en-US" dirty="0"/>
           </a:p>
@@ -9475,7 +8317,7 @@
     </p:spTree>
     <p:extLst>
       <p:ext uri="{BB962C8B-B14F-4D97-AF65-F5344CB8AC3E}">
-        <p14:creationId xmlns:p14="http://schemas.microsoft.com/office/powerpoint/2010/main" val="2020340630"/>
+        <p14:creationId xmlns:p14="http://schemas.microsoft.com/office/powerpoint/2010/main" val="2475675609"/>
       </p:ext>
     </p:extLst>
   </p:cSld>
@@ -9524,9 +8366,15 @@
           <a:p>
             <a:r>
               <a:rPr lang="en-US" dirty="0" smtClean="0"/>
-              <a:t>Passion for your work is no substitute for love.</a:t>
-            </a:r>
-            <a:endParaRPr lang="en-US" dirty="0"/>
+              <a:t>Being good at something and being happy at it</a:t>
+            </a:r>
+            <a:br>
+              <a:rPr lang="en-US" dirty="0" smtClean="0"/>
+            </a:br>
+            <a:r>
+              <a:rPr lang="en-US" dirty="0" smtClean="0"/>
+              <a:t>are two very different things.</a:t>
+            </a:r>
           </a:p>
         </p:txBody>
       </p:sp>
@@ -9547,7 +8395,7 @@
           <a:p>
             <a:r>
               <a:rPr lang="en-US" dirty="0" smtClean="0"/>
-              <a:t>Your Job Is Not Your Life</a:t>
+              <a:t>Be True To Yourself</a:t>
             </a:r>
             <a:endParaRPr lang="en-US" dirty="0"/>
           </a:p>
@@ -9556,7 +8404,7 @@
     </p:spTree>
     <p:extLst>
       <p:ext uri="{BB962C8B-B14F-4D97-AF65-F5344CB8AC3E}">
-        <p14:creationId xmlns:p14="http://schemas.microsoft.com/office/powerpoint/2010/main" val="2022144273"/>
+        <p14:creationId xmlns:p14="http://schemas.microsoft.com/office/powerpoint/2010/main" val="988935340"/>
       </p:ext>
     </p:extLst>
   </p:cSld>
@@ -9605,14 +8453,7 @@
           <a:p>
             <a:r>
               <a:rPr lang="en-US" dirty="0" smtClean="0"/>
-              <a:t>Teams are made of individuals and each individual is important,</a:t>
-            </a:r>
-            <a:br>
-              <a:rPr lang="en-US" dirty="0" smtClean="0"/>
-            </a:br>
-            <a:r>
-              <a:rPr lang="en-US" dirty="0" smtClean="0"/>
-              <a:t>but teams succeed and fail as a whole.</a:t>
+              <a:t>They won’t say “Yes” if you don’t ask.</a:t>
             </a:r>
             <a:endParaRPr lang="en-US" dirty="0"/>
           </a:p>
@@ -9635,7 +8476,7 @@
           <a:p>
             <a:r>
               <a:rPr lang="en-US" dirty="0" smtClean="0"/>
-              <a:t>Teams Stand Together</a:t>
+              <a:t>Take Risks</a:t>
             </a:r>
             <a:endParaRPr lang="en-US" dirty="0"/>
           </a:p>
@@ -9644,7 +8485,7 @@
     </p:spTree>
     <p:extLst>
       <p:ext uri="{BB962C8B-B14F-4D97-AF65-F5344CB8AC3E}">
-        <p14:creationId xmlns:p14="http://schemas.microsoft.com/office/powerpoint/2010/main" val="2709397366"/>
+        <p14:creationId xmlns:p14="http://schemas.microsoft.com/office/powerpoint/2010/main" val="3649793155"/>
       </p:ext>
     </p:extLst>
   </p:cSld>
@@ -9693,15 +8534,16 @@
           <a:p>
             <a:r>
               <a:rPr lang="en-US" dirty="0" smtClean="0"/>
-              <a:t>Understanding why things went wrong is important,</a:t>
+              <a:t>None of us have a monopoly on intelligence, cleverness,</a:t>
             </a:r>
             <a:br>
               <a:rPr lang="en-US" dirty="0" smtClean="0"/>
             </a:br>
             <a:r>
               <a:rPr lang="en-US" dirty="0" smtClean="0"/>
-              <a:t>but fixing the problem is what really matters.</a:t>
-            </a:r>
+              <a:t>creativity, or innovation. Celebrate diversity.</a:t>
+            </a:r>
+            <a:endParaRPr lang="en-US" dirty="0"/>
           </a:p>
         </p:txBody>
       </p:sp>
@@ -9722,7 +8564,7 @@
           <a:p>
             <a:r>
               <a:rPr lang="en-US" dirty="0" smtClean="0"/>
-              <a:t>Offer Solutions, Not Excuses</a:t>
+              <a:t>Sometimes The Best Idea Isn’t Yours</a:t>
             </a:r>
             <a:endParaRPr lang="en-US" dirty="0"/>
           </a:p>
@@ -9731,7 +8573,7 @@
     </p:spTree>
     <p:extLst>
       <p:ext uri="{BB962C8B-B14F-4D97-AF65-F5344CB8AC3E}">
-        <p14:creationId xmlns:p14="http://schemas.microsoft.com/office/powerpoint/2010/main" val="1931047125"/>
+        <p14:creationId xmlns:p14="http://schemas.microsoft.com/office/powerpoint/2010/main" val="2032827942"/>
       </p:ext>
     </p:extLst>
   </p:cSld>
@@ -9780,7 +8622,7 @@
           <a:p>
             <a:r>
               <a:rPr lang="en-US" dirty="0" smtClean="0"/>
-              <a:t>Leave things better than how you found them.</a:t>
+              <a:t>Than to be mediocre and Plan A.</a:t>
             </a:r>
             <a:endParaRPr lang="en-US" dirty="0"/>
           </a:p>
@@ -9803,7 +8645,7 @@
           <a:p>
             <a:r>
               <a:rPr lang="en-US" dirty="0" smtClean="0"/>
-              <a:t>Failures Are Also Opportunities</a:t>
+              <a:t>It’s Better To Excel At Plan B</a:t>
             </a:r>
             <a:endParaRPr lang="en-US" dirty="0"/>
           </a:p>
@@ -9812,7 +8654,7 @@
     </p:spTree>
     <p:extLst>
       <p:ext uri="{BB962C8B-B14F-4D97-AF65-F5344CB8AC3E}">
-        <p14:creationId xmlns:p14="http://schemas.microsoft.com/office/powerpoint/2010/main" val="2676105984"/>
+        <p14:creationId xmlns:p14="http://schemas.microsoft.com/office/powerpoint/2010/main" val="533328817"/>
       </p:ext>
     </p:extLst>
   </p:cSld>
@@ -9962,7 +8804,7 @@
           <a:p>
             <a:r>
               <a:rPr lang="en-US" dirty="0" smtClean="0"/>
-              <a:t>Listen to your conscience, it’s smarter than you are.</a:t>
+              <a:t>Love your life, love your family, love your job, love yourself.</a:t>
             </a:r>
             <a:endParaRPr lang="en-US" dirty="0"/>
           </a:p>
@@ -9985,7 +8827,7 @@
           <a:p>
             <a:r>
               <a:rPr lang="en-US" dirty="0" smtClean="0"/>
-              <a:t>Do The Right Thing</a:t>
+              <a:t>Do What You Love, Love What You Do</a:t>
             </a:r>
             <a:endParaRPr lang="en-US" dirty="0"/>
           </a:p>
@@ -9994,7 +8836,7 @@
     </p:spTree>
     <p:extLst>
       <p:ext uri="{BB962C8B-B14F-4D97-AF65-F5344CB8AC3E}">
-        <p14:creationId xmlns:p14="http://schemas.microsoft.com/office/powerpoint/2010/main" val="2029694636"/>
+        <p14:creationId xmlns:p14="http://schemas.microsoft.com/office/powerpoint/2010/main" val="2343337793"/>
       </p:ext>
     </p:extLst>
   </p:cSld>
@@ -10038,600 +8880,6 @@
           </a:xfrm>
         </p:spPr>
         <p:txBody>
-          <a:bodyPr/>
-          <a:lstStyle/>
-          <a:p>
-            <a:r>
-              <a:rPr lang="en-US" dirty="0" smtClean="0"/>
-              <a:t>Good leaders get credit for high performance teams,</a:t>
-            </a:r>
-            <a:br>
-              <a:rPr lang="en-US" dirty="0" smtClean="0"/>
-            </a:br>
-            <a:r>
-              <a:rPr lang="en-US" dirty="0" smtClean="0"/>
-              <a:t>they don’t need to take credit for individual achievements.</a:t>
-            </a:r>
-            <a:endParaRPr lang="en-US" dirty="0"/>
-          </a:p>
-        </p:txBody>
-      </p:sp>
-      <p:sp>
-        <p:nvSpPr>
-          <p:cNvPr id="3" name="Title 2"/>
-          <p:cNvSpPr>
-            <a:spLocks noGrp="1"/>
-          </p:cNvSpPr>
-          <p:nvPr>
-            <p:ph type="ctrTitle"/>
-          </p:nvPr>
-        </p:nvSpPr>
-        <p:spPr/>
-        <p:txBody>
-          <a:bodyPr/>
-          <a:lstStyle/>
-          <a:p>
-            <a:r>
-              <a:rPr lang="en-US" dirty="0" smtClean="0"/>
-              <a:t>My Team Gets Credit, I Get Blame</a:t>
-            </a:r>
-            <a:endParaRPr lang="en-US" dirty="0"/>
-          </a:p>
-        </p:txBody>
-      </p:sp>
-    </p:spTree>
-    <p:extLst>
-      <p:ext uri="{BB962C8B-B14F-4D97-AF65-F5344CB8AC3E}">
-        <p14:creationId xmlns:p14="http://schemas.microsoft.com/office/powerpoint/2010/main" val="2475675609"/>
-      </p:ext>
-    </p:extLst>
-  </p:cSld>
-  <p:clrMapOvr>
-    <a:masterClrMapping/>
-  </p:clrMapOvr>
-</p:sld>
-</file>
-
-<file path=ppt/slides/slide22.xml><?xml version="1.0" encoding="utf-8"?>
-<p:sld xmlns:a="http://schemas.openxmlformats.org/drawingml/2006/main" xmlns:r="http://schemas.openxmlformats.org/officeDocument/2006/relationships" xmlns:p="http://schemas.openxmlformats.org/presentationml/2006/main">
-  <p:cSld>
-    <p:spTree>
-      <p:nvGrpSpPr>
-        <p:cNvPr id="1" name=""/>
-        <p:cNvGrpSpPr/>
-        <p:nvPr/>
-      </p:nvGrpSpPr>
-      <p:grpSpPr>
-        <a:xfrm>
-          <a:off x="0" y="0"/>
-          <a:ext cx="0" cy="0"/>
-          <a:chOff x="0" y="0"/>
-          <a:chExt cx="0" cy="0"/>
-        </a:xfrm>
-      </p:grpSpPr>
-      <p:sp>
-        <p:nvSpPr>
-          <p:cNvPr id="2" name="Subtitle 1"/>
-          <p:cNvSpPr>
-            <a:spLocks noGrp="1"/>
-          </p:cNvSpPr>
-          <p:nvPr>
-            <p:ph type="subTitle" idx="1"/>
-          </p:nvPr>
-        </p:nvSpPr>
-        <p:spPr>
-          <a:xfrm>
-            <a:off x="685800" y="3886200"/>
-            <a:ext cx="7772400" cy="1752600"/>
-          </a:xfrm>
-        </p:spPr>
-        <p:txBody>
-          <a:bodyPr/>
-          <a:lstStyle/>
-          <a:p>
-            <a:r>
-              <a:rPr lang="en-US" dirty="0" smtClean="0"/>
-              <a:t>Being good at something and being happy at it</a:t>
-            </a:r>
-            <a:br>
-              <a:rPr lang="en-US" dirty="0" smtClean="0"/>
-            </a:br>
-            <a:r>
-              <a:rPr lang="en-US" dirty="0" smtClean="0"/>
-              <a:t>are two very different things.</a:t>
-            </a:r>
-          </a:p>
-        </p:txBody>
-      </p:sp>
-      <p:sp>
-        <p:nvSpPr>
-          <p:cNvPr id="3" name="Title 2"/>
-          <p:cNvSpPr>
-            <a:spLocks noGrp="1"/>
-          </p:cNvSpPr>
-          <p:nvPr>
-            <p:ph type="ctrTitle"/>
-          </p:nvPr>
-        </p:nvSpPr>
-        <p:spPr/>
-        <p:txBody>
-          <a:bodyPr/>
-          <a:lstStyle/>
-          <a:p>
-            <a:r>
-              <a:rPr lang="en-US" dirty="0" smtClean="0"/>
-              <a:t>Be True To Yourself</a:t>
-            </a:r>
-            <a:endParaRPr lang="en-US" dirty="0"/>
-          </a:p>
-        </p:txBody>
-      </p:sp>
-    </p:spTree>
-    <p:extLst>
-      <p:ext uri="{BB962C8B-B14F-4D97-AF65-F5344CB8AC3E}">
-        <p14:creationId xmlns:p14="http://schemas.microsoft.com/office/powerpoint/2010/main" val="988935340"/>
-      </p:ext>
-    </p:extLst>
-  </p:cSld>
-  <p:clrMapOvr>
-    <a:masterClrMapping/>
-  </p:clrMapOvr>
-</p:sld>
-</file>
-
-<file path=ppt/slides/slide23.xml><?xml version="1.0" encoding="utf-8"?>
-<p:sld xmlns:a="http://schemas.openxmlformats.org/drawingml/2006/main" xmlns:r="http://schemas.openxmlformats.org/officeDocument/2006/relationships" xmlns:p="http://schemas.openxmlformats.org/presentationml/2006/main">
-  <p:cSld>
-    <p:spTree>
-      <p:nvGrpSpPr>
-        <p:cNvPr id="1" name=""/>
-        <p:cNvGrpSpPr/>
-        <p:nvPr/>
-      </p:nvGrpSpPr>
-      <p:grpSpPr>
-        <a:xfrm>
-          <a:off x="0" y="0"/>
-          <a:ext cx="0" cy="0"/>
-          <a:chOff x="0" y="0"/>
-          <a:chExt cx="0" cy="0"/>
-        </a:xfrm>
-      </p:grpSpPr>
-      <p:sp>
-        <p:nvSpPr>
-          <p:cNvPr id="2" name="Subtitle 1"/>
-          <p:cNvSpPr>
-            <a:spLocks noGrp="1"/>
-          </p:cNvSpPr>
-          <p:nvPr>
-            <p:ph type="subTitle" idx="1"/>
-          </p:nvPr>
-        </p:nvSpPr>
-        <p:spPr>
-          <a:xfrm>
-            <a:off x="685800" y="3886200"/>
-            <a:ext cx="7772400" cy="1752600"/>
-          </a:xfrm>
-        </p:spPr>
-        <p:txBody>
-          <a:bodyPr/>
-          <a:lstStyle/>
-          <a:p>
-            <a:r>
-              <a:rPr lang="en-US" dirty="0" smtClean="0"/>
-              <a:t>Be accountable for your mistakes.</a:t>
-            </a:r>
-            <a:br>
-              <a:rPr lang="en-US" dirty="0" smtClean="0"/>
-            </a:br>
-            <a:r>
-              <a:rPr lang="en-US" dirty="0" smtClean="0"/>
-              <a:t>Learn from them and move on.</a:t>
-            </a:r>
-            <a:endParaRPr lang="en-US" dirty="0"/>
-          </a:p>
-        </p:txBody>
-      </p:sp>
-      <p:sp>
-        <p:nvSpPr>
-          <p:cNvPr id="3" name="Title 2"/>
-          <p:cNvSpPr>
-            <a:spLocks noGrp="1"/>
-          </p:cNvSpPr>
-          <p:nvPr>
-            <p:ph type="ctrTitle"/>
-          </p:nvPr>
-        </p:nvSpPr>
-        <p:spPr/>
-        <p:txBody>
-          <a:bodyPr/>
-          <a:lstStyle/>
-          <a:p>
-            <a:r>
-              <a:rPr lang="en-US" dirty="0" smtClean="0"/>
-              <a:t>Sometimes People Screw Up</a:t>
-            </a:r>
-            <a:endParaRPr lang="en-US" dirty="0"/>
-          </a:p>
-        </p:txBody>
-      </p:sp>
-    </p:spTree>
-    <p:extLst>
-      <p:ext uri="{BB962C8B-B14F-4D97-AF65-F5344CB8AC3E}">
-        <p14:creationId xmlns:p14="http://schemas.microsoft.com/office/powerpoint/2010/main" val="2175080584"/>
-      </p:ext>
-    </p:extLst>
-  </p:cSld>
-  <p:clrMapOvr>
-    <a:masterClrMapping/>
-  </p:clrMapOvr>
-</p:sld>
-</file>
-
-<file path=ppt/slides/slide24.xml><?xml version="1.0" encoding="utf-8"?>
-<p:sld xmlns:a="http://schemas.openxmlformats.org/drawingml/2006/main" xmlns:r="http://schemas.openxmlformats.org/officeDocument/2006/relationships" xmlns:p="http://schemas.openxmlformats.org/presentationml/2006/main">
-  <p:cSld>
-    <p:spTree>
-      <p:nvGrpSpPr>
-        <p:cNvPr id="1" name=""/>
-        <p:cNvGrpSpPr/>
-        <p:nvPr/>
-      </p:nvGrpSpPr>
-      <p:grpSpPr>
-        <a:xfrm>
-          <a:off x="0" y="0"/>
-          <a:ext cx="0" cy="0"/>
-          <a:chOff x="0" y="0"/>
-          <a:chExt cx="0" cy="0"/>
-        </a:xfrm>
-      </p:grpSpPr>
-      <p:sp>
-        <p:nvSpPr>
-          <p:cNvPr id="2" name="Subtitle 1"/>
-          <p:cNvSpPr>
-            <a:spLocks noGrp="1"/>
-          </p:cNvSpPr>
-          <p:nvPr>
-            <p:ph type="subTitle" idx="1"/>
-          </p:nvPr>
-        </p:nvSpPr>
-        <p:spPr>
-          <a:xfrm>
-            <a:off x="685800" y="3886200"/>
-            <a:ext cx="7772400" cy="1752600"/>
-          </a:xfrm>
-        </p:spPr>
-        <p:txBody>
-          <a:bodyPr/>
-          <a:lstStyle/>
-          <a:p>
-            <a:r>
-              <a:rPr lang="en-US" dirty="0" smtClean="0"/>
-              <a:t>They won’t say “Yes” if you don’t ask.</a:t>
-            </a:r>
-            <a:endParaRPr lang="en-US" dirty="0"/>
-          </a:p>
-        </p:txBody>
-      </p:sp>
-      <p:sp>
-        <p:nvSpPr>
-          <p:cNvPr id="3" name="Title 2"/>
-          <p:cNvSpPr>
-            <a:spLocks noGrp="1"/>
-          </p:cNvSpPr>
-          <p:nvPr>
-            <p:ph type="ctrTitle"/>
-          </p:nvPr>
-        </p:nvSpPr>
-        <p:spPr/>
-        <p:txBody>
-          <a:bodyPr/>
-          <a:lstStyle/>
-          <a:p>
-            <a:r>
-              <a:rPr lang="en-US" dirty="0" smtClean="0"/>
-              <a:t>Take Risks</a:t>
-            </a:r>
-            <a:endParaRPr lang="en-US" dirty="0"/>
-          </a:p>
-        </p:txBody>
-      </p:sp>
-    </p:spTree>
-    <p:extLst>
-      <p:ext uri="{BB962C8B-B14F-4D97-AF65-F5344CB8AC3E}">
-        <p14:creationId xmlns:p14="http://schemas.microsoft.com/office/powerpoint/2010/main" val="3649793155"/>
-      </p:ext>
-    </p:extLst>
-  </p:cSld>
-  <p:clrMapOvr>
-    <a:masterClrMapping/>
-  </p:clrMapOvr>
-</p:sld>
-</file>
-
-<file path=ppt/slides/slide25.xml><?xml version="1.0" encoding="utf-8"?>
-<p:sld xmlns:a="http://schemas.openxmlformats.org/drawingml/2006/main" xmlns:r="http://schemas.openxmlformats.org/officeDocument/2006/relationships" xmlns:p="http://schemas.openxmlformats.org/presentationml/2006/main">
-  <p:cSld>
-    <p:spTree>
-      <p:nvGrpSpPr>
-        <p:cNvPr id="1" name=""/>
-        <p:cNvGrpSpPr/>
-        <p:nvPr/>
-      </p:nvGrpSpPr>
-      <p:grpSpPr>
-        <a:xfrm>
-          <a:off x="0" y="0"/>
-          <a:ext cx="0" cy="0"/>
-          <a:chOff x="0" y="0"/>
-          <a:chExt cx="0" cy="0"/>
-        </a:xfrm>
-      </p:grpSpPr>
-      <p:sp>
-        <p:nvSpPr>
-          <p:cNvPr id="2" name="Subtitle 1"/>
-          <p:cNvSpPr>
-            <a:spLocks noGrp="1"/>
-          </p:cNvSpPr>
-          <p:nvPr>
-            <p:ph type="subTitle" idx="1"/>
-          </p:nvPr>
-        </p:nvSpPr>
-        <p:spPr>
-          <a:xfrm>
-            <a:off x="685800" y="3886200"/>
-            <a:ext cx="7772400" cy="1752600"/>
-          </a:xfrm>
-        </p:spPr>
-        <p:txBody>
-          <a:bodyPr/>
-          <a:lstStyle/>
-          <a:p>
-            <a:r>
-              <a:rPr lang="en-US" dirty="0" smtClean="0"/>
-              <a:t>None of us have a monopoly on intelligence, cleverness,</a:t>
-            </a:r>
-            <a:br>
-              <a:rPr lang="en-US" dirty="0" smtClean="0"/>
-            </a:br>
-            <a:r>
-              <a:rPr lang="en-US" dirty="0" smtClean="0"/>
-              <a:t>creativity, or innovation. Celebrate diversity.</a:t>
-            </a:r>
-            <a:endParaRPr lang="en-US" dirty="0"/>
-          </a:p>
-        </p:txBody>
-      </p:sp>
-      <p:sp>
-        <p:nvSpPr>
-          <p:cNvPr id="3" name="Title 2"/>
-          <p:cNvSpPr>
-            <a:spLocks noGrp="1"/>
-          </p:cNvSpPr>
-          <p:nvPr>
-            <p:ph type="ctrTitle"/>
-          </p:nvPr>
-        </p:nvSpPr>
-        <p:spPr/>
-        <p:txBody>
-          <a:bodyPr/>
-          <a:lstStyle/>
-          <a:p>
-            <a:r>
-              <a:rPr lang="en-US" dirty="0" smtClean="0"/>
-              <a:t>Sometimes The Best Idea Isn’t Yours</a:t>
-            </a:r>
-            <a:endParaRPr lang="en-US" dirty="0"/>
-          </a:p>
-        </p:txBody>
-      </p:sp>
-    </p:spTree>
-    <p:extLst>
-      <p:ext uri="{BB962C8B-B14F-4D97-AF65-F5344CB8AC3E}">
-        <p14:creationId xmlns:p14="http://schemas.microsoft.com/office/powerpoint/2010/main" val="2032827942"/>
-      </p:ext>
-    </p:extLst>
-  </p:cSld>
-  <p:clrMapOvr>
-    <a:masterClrMapping/>
-  </p:clrMapOvr>
-</p:sld>
-</file>
-
-<file path=ppt/slides/slide26.xml><?xml version="1.0" encoding="utf-8"?>
-<p:sld xmlns:a="http://schemas.openxmlformats.org/drawingml/2006/main" xmlns:r="http://schemas.openxmlformats.org/officeDocument/2006/relationships" xmlns:p="http://schemas.openxmlformats.org/presentationml/2006/main">
-  <p:cSld>
-    <p:spTree>
-      <p:nvGrpSpPr>
-        <p:cNvPr id="1" name=""/>
-        <p:cNvGrpSpPr/>
-        <p:nvPr/>
-      </p:nvGrpSpPr>
-      <p:grpSpPr>
-        <a:xfrm>
-          <a:off x="0" y="0"/>
-          <a:ext cx="0" cy="0"/>
-          <a:chOff x="0" y="0"/>
-          <a:chExt cx="0" cy="0"/>
-        </a:xfrm>
-      </p:grpSpPr>
-      <p:sp>
-        <p:nvSpPr>
-          <p:cNvPr id="2" name="Subtitle 1"/>
-          <p:cNvSpPr>
-            <a:spLocks noGrp="1"/>
-          </p:cNvSpPr>
-          <p:nvPr>
-            <p:ph type="subTitle" idx="1"/>
-          </p:nvPr>
-        </p:nvSpPr>
-        <p:spPr>
-          <a:xfrm>
-            <a:off x="685800" y="3886200"/>
-            <a:ext cx="7772400" cy="1752600"/>
-          </a:xfrm>
-        </p:spPr>
-        <p:txBody>
-          <a:bodyPr/>
-          <a:lstStyle/>
-          <a:p>
-            <a:r>
-              <a:rPr lang="en-US" dirty="0" smtClean="0"/>
-              <a:t>Than to be mediocre and Plan A.</a:t>
-            </a:r>
-            <a:endParaRPr lang="en-US" dirty="0"/>
-          </a:p>
-        </p:txBody>
-      </p:sp>
-      <p:sp>
-        <p:nvSpPr>
-          <p:cNvPr id="3" name="Title 2"/>
-          <p:cNvSpPr>
-            <a:spLocks noGrp="1"/>
-          </p:cNvSpPr>
-          <p:nvPr>
-            <p:ph type="ctrTitle"/>
-          </p:nvPr>
-        </p:nvSpPr>
-        <p:spPr/>
-        <p:txBody>
-          <a:bodyPr/>
-          <a:lstStyle/>
-          <a:p>
-            <a:r>
-              <a:rPr lang="en-US" dirty="0" smtClean="0"/>
-              <a:t>It’s Better To Excel At Plan B</a:t>
-            </a:r>
-            <a:endParaRPr lang="en-US" dirty="0"/>
-          </a:p>
-        </p:txBody>
-      </p:sp>
-    </p:spTree>
-    <p:extLst>
-      <p:ext uri="{BB962C8B-B14F-4D97-AF65-F5344CB8AC3E}">
-        <p14:creationId xmlns:p14="http://schemas.microsoft.com/office/powerpoint/2010/main" val="533328817"/>
-      </p:ext>
-    </p:extLst>
-  </p:cSld>
-  <p:clrMapOvr>
-    <a:masterClrMapping/>
-  </p:clrMapOvr>
-</p:sld>
-</file>
-
-<file path=ppt/slides/slide27.xml><?xml version="1.0" encoding="utf-8"?>
-<p:sld xmlns:a="http://schemas.openxmlformats.org/drawingml/2006/main" xmlns:r="http://schemas.openxmlformats.org/officeDocument/2006/relationships" xmlns:p="http://schemas.openxmlformats.org/presentationml/2006/main">
-  <p:cSld>
-    <p:spTree>
-      <p:nvGrpSpPr>
-        <p:cNvPr id="1" name=""/>
-        <p:cNvGrpSpPr/>
-        <p:nvPr/>
-      </p:nvGrpSpPr>
-      <p:grpSpPr>
-        <a:xfrm>
-          <a:off x="0" y="0"/>
-          <a:ext cx="0" cy="0"/>
-          <a:chOff x="0" y="0"/>
-          <a:chExt cx="0" cy="0"/>
-        </a:xfrm>
-      </p:grpSpPr>
-      <p:sp>
-        <p:nvSpPr>
-          <p:cNvPr id="2" name="Subtitle 1"/>
-          <p:cNvSpPr>
-            <a:spLocks noGrp="1"/>
-          </p:cNvSpPr>
-          <p:nvPr>
-            <p:ph type="subTitle" idx="1"/>
-          </p:nvPr>
-        </p:nvSpPr>
-        <p:spPr>
-          <a:xfrm>
-            <a:off x="685800" y="3886200"/>
-            <a:ext cx="7772400" cy="1752600"/>
-          </a:xfrm>
-        </p:spPr>
-        <p:txBody>
-          <a:bodyPr/>
-          <a:lstStyle/>
-          <a:p>
-            <a:r>
-              <a:rPr lang="en-US" dirty="0" smtClean="0"/>
-              <a:t>Love your life, love your family, love your job, love yourself.</a:t>
-            </a:r>
-            <a:endParaRPr lang="en-US" dirty="0"/>
-          </a:p>
-        </p:txBody>
-      </p:sp>
-      <p:sp>
-        <p:nvSpPr>
-          <p:cNvPr id="3" name="Title 2"/>
-          <p:cNvSpPr>
-            <a:spLocks noGrp="1"/>
-          </p:cNvSpPr>
-          <p:nvPr>
-            <p:ph type="ctrTitle"/>
-          </p:nvPr>
-        </p:nvSpPr>
-        <p:spPr/>
-        <p:txBody>
-          <a:bodyPr/>
-          <a:lstStyle/>
-          <a:p>
-            <a:r>
-              <a:rPr lang="en-US" dirty="0" smtClean="0"/>
-              <a:t>Do What You Love, Love What You Do</a:t>
-            </a:r>
-            <a:endParaRPr lang="en-US" dirty="0"/>
-          </a:p>
-        </p:txBody>
-      </p:sp>
-    </p:spTree>
-    <p:extLst>
-      <p:ext uri="{BB962C8B-B14F-4D97-AF65-F5344CB8AC3E}">
-        <p14:creationId xmlns:p14="http://schemas.microsoft.com/office/powerpoint/2010/main" val="2343337793"/>
-      </p:ext>
-    </p:extLst>
-  </p:cSld>
-  <p:clrMapOvr>
-    <a:masterClrMapping/>
-  </p:clrMapOvr>
-</p:sld>
-</file>
-
-<file path=ppt/slides/slide28.xml><?xml version="1.0" encoding="utf-8"?>
-<p:sld xmlns:a="http://schemas.openxmlformats.org/drawingml/2006/main" xmlns:r="http://schemas.openxmlformats.org/officeDocument/2006/relationships" xmlns:p="http://schemas.openxmlformats.org/presentationml/2006/main">
-  <p:cSld>
-    <p:spTree>
-      <p:nvGrpSpPr>
-        <p:cNvPr id="1" name=""/>
-        <p:cNvGrpSpPr/>
-        <p:nvPr/>
-      </p:nvGrpSpPr>
-      <p:grpSpPr>
-        <a:xfrm>
-          <a:off x="0" y="0"/>
-          <a:ext cx="0" cy="0"/>
-          <a:chOff x="0" y="0"/>
-          <a:chExt cx="0" cy="0"/>
-        </a:xfrm>
-      </p:grpSpPr>
-      <p:sp>
-        <p:nvSpPr>
-          <p:cNvPr id="2" name="Subtitle 1"/>
-          <p:cNvSpPr>
-            <a:spLocks noGrp="1"/>
-          </p:cNvSpPr>
-          <p:nvPr>
-            <p:ph type="subTitle" idx="1"/>
-          </p:nvPr>
-        </p:nvSpPr>
-        <p:spPr>
-          <a:xfrm>
-            <a:off x="685800" y="3886200"/>
-            <a:ext cx="7772400" cy="1752600"/>
-          </a:xfrm>
-        </p:spPr>
-        <p:txBody>
           <a:bodyPr>
             <a:normAutofit fontScale="92500" lnSpcReduction="10000"/>
           </a:bodyPr>
@@ -10705,7 +8953,7 @@
 </p:sld>
 </file>
 
-<file path=ppt/slides/slide29.xml><?xml version="1.0" encoding="utf-8"?>
+<file path=ppt/slides/slide22.xml><?xml version="1.0" encoding="utf-8"?>
 <p:sld xmlns:a="http://schemas.openxmlformats.org/drawingml/2006/main" xmlns:r="http://schemas.openxmlformats.org/officeDocument/2006/relationships" xmlns:p="http://schemas.openxmlformats.org/presentationml/2006/main">
   <p:cSld>
     <p:spTree>
@@ -11081,8 +9329,9 @@
             </a:br>
             <a:r>
               <a:rPr lang="en-US" dirty="0" smtClean="0"/>
-              <a:t>even when their potentials widely differ.</a:t>
-            </a:r>
+              <a:t>every member of the team is equally valuable.</a:t>
+            </a:r>
+            <a:endParaRPr lang="en-US" dirty="0" smtClean="0"/>
           </a:p>
         </p:txBody>
       </p:sp>
@@ -11532,7 +9781,14 @@
           <a:p>
             <a:r>
               <a:rPr lang="en-US" dirty="0" smtClean="0"/>
-              <a:t>But you will survive.</a:t>
+              <a:t>When someone isn’t getting the job done there is a reason.</a:t>
+            </a:r>
+            <a:br>
+              <a:rPr lang="en-US" dirty="0" smtClean="0"/>
+            </a:br>
+            <a:r>
+              <a:rPr lang="en-US" dirty="0" smtClean="0"/>
+              <a:t>Find the reason and address the real problem.</a:t>
             </a:r>
             <a:endParaRPr lang="en-US" dirty="0"/>
           </a:p>
@@ -11554,56 +9810,8 @@
           <a:lstStyle/>
           <a:p>
             <a:r>
-              <a:rPr lang="en-US" dirty="0"/>
-              <a:t>B</a:t>
-            </a:r>
-            <a:r>
-              <a:rPr lang="en-US" dirty="0" smtClean="0"/>
-              <a:t>ad </a:t>
-            </a:r>
-            <a:r>
-              <a:rPr lang="en-US" dirty="0"/>
-              <a:t>T</a:t>
-            </a:r>
-            <a:r>
-              <a:rPr lang="en-US" dirty="0" smtClean="0"/>
-              <a:t>hings </a:t>
-            </a:r>
-            <a:r>
-              <a:rPr lang="en-US" i="1" dirty="0"/>
-              <a:t>W</a:t>
-            </a:r>
-            <a:r>
-              <a:rPr lang="en-US" i="1" dirty="0" smtClean="0"/>
-              <a:t>ill</a:t>
-            </a:r>
-            <a:r>
-              <a:rPr lang="en-US" dirty="0" smtClean="0"/>
-              <a:t> </a:t>
-            </a:r>
-            <a:r>
-              <a:rPr lang="en-US" dirty="0"/>
-              <a:t>H</a:t>
-            </a:r>
-            <a:r>
-              <a:rPr lang="en-US" dirty="0" smtClean="0"/>
-              <a:t>appen </a:t>
-            </a:r>
-            <a:r>
-              <a:rPr lang="en-US" dirty="0"/>
-              <a:t>T</a:t>
-            </a:r>
-            <a:r>
-              <a:rPr lang="en-US" dirty="0" smtClean="0"/>
-              <a:t>o </a:t>
-            </a:r>
-            <a:r>
-              <a:rPr lang="en-US" dirty="0"/>
-              <a:t>Y</a:t>
-            </a:r>
-            <a:r>
-              <a:rPr lang="en-US" dirty="0" smtClean="0"/>
-              <a:t>ou</a:t>
+              <a:rPr lang="en-US" dirty="0" smtClean="0"/>
+              <a:t>No One Wants To Do Bad Work</a:t>
             </a:r>
             <a:endParaRPr lang="en-US" dirty="0"/>
           </a:p>
@@ -11612,7 +9820,7 @@
     </p:spTree>
     <p:extLst>
       <p:ext uri="{BB962C8B-B14F-4D97-AF65-F5344CB8AC3E}">
-        <p14:creationId xmlns:p14="http://schemas.microsoft.com/office/powerpoint/2010/main" val="308711355"/>
+        <p14:creationId xmlns:p14="http://schemas.microsoft.com/office/powerpoint/2010/main" val="2740943154"/>
       </p:ext>
     </p:extLst>
   </p:cSld>

</xml_diff>

<commit_message>
Minor update to notes.
</commit_message>
<xml_diff>
--- a/what-ive-learned-presentation.pptx
+++ b/what-ive-learned-presentation.pptx
@@ -993,11 +993,7 @@
           <a:p>
             <a:r>
               <a:rPr lang="en-US" dirty="0" smtClean="0"/>
-              <a:t>## </a:t>
-            </a:r>
-            <a:r>
-              <a:rPr lang="en-US" dirty="0" smtClean="0"/>
-              <a:t>Good</a:t>
+              <a:t>## Good</a:t>
             </a:r>
             <a:r>
               <a:rPr lang="en-US" baseline="0" dirty="0" smtClean="0"/>
@@ -1005,11 +1001,7 @@
             </a:r>
             <a:r>
               <a:rPr lang="en-US" dirty="0" smtClean="0"/>
-              <a:t>eams </a:t>
-            </a:r>
-            <a:r>
-              <a:rPr lang="en-US" dirty="0" smtClean="0"/>
-              <a:t>stand together</a:t>
+              <a:t>eams stand together</a:t>
             </a:r>
           </a:p>
           <a:p>
@@ -1456,11 +1448,7 @@
           <a:p>
             <a:r>
               <a:rPr lang="en-US" dirty="0" smtClean="0"/>
-              <a:t>In my next job I found myself taking over a failed project (again). My predecessor was a good person but a bad fit in the role. So </a:t>
-            </a:r>
-            <a:r>
-              <a:rPr lang="en-US" dirty="0" smtClean="0"/>
-              <a:t>we get the project turned around and we start cranking out code. We made some very pragmatic decisions but the funder was happy and stopped threatening to pull the funds. Then one day one of the members of the business team--someone I workers with at my previous job and someone with whom I shared tremendous mutual respect--got upset over a feature.</a:t>
+              <a:t>In my next job I found myself taking over a failed project (again). My predecessor was a good person but a bad fit in the role. So we get the project turned around and we start cranking out code. We made some very pragmatic decisions but the funder was happy and stopped threatening to pull the funds. Then one day one of the members of the business team--someone I workers with at my previous job and someone with whom I shared tremendous mutual respect--got upset over a feature.</a:t>
             </a:r>
           </a:p>
           <a:p>
@@ -1829,7 +1817,11 @@
           <a:p>
             <a:r>
               <a:rPr lang="en-US" dirty="0" smtClean="0"/>
-              <a:t>So now I'm nearly 20 years into my career. I've been a student, a teacher, a boss, and a teammate. I'm very established in my area and have a pretty good (thought not spotless) reputation. I work for a great company doing interesting work with some of the best tech professionals I have ever met. By all accounts my career is good. But that's no excuse for resting on my laurels.</a:t>
+              <a:t>So now I'm nearly 20 years into my career. I've been a student, a teacher, a boss, and a teammate. I'm established in my area and have a good reputation. I work for a great company doing interesting work with some of the best tech professionals I've ever met. By all accounts my career is good. </a:t>
+            </a:r>
+            <a:r>
+              <a:rPr lang="en-US" smtClean="0"/>
+              <a:t>But that's no excuse for resting on my laurels.</a:t>
             </a:r>
           </a:p>
           <a:p>
@@ -1927,10 +1919,9 @@
           </a:p>
           <a:p>
             <a:r>
-              <a:rPr lang="en-US" smtClean="0"/>
+              <a:rPr lang="en-US" dirty="0" smtClean="0"/>
               <a:t>* "If somebody offers you an amazing opportunity but you are not sure you can do it, say yes – then learn how to do it later!" ― Richard Branson</a:t>
             </a:r>
-            <a:endParaRPr lang="en-US" dirty="0" smtClean="0"/>
           </a:p>
         </p:txBody>
       </p:sp>
@@ -3010,15 +3001,7 @@
           <a:p>
             <a:r>
               <a:rPr lang="en-US" dirty="0" smtClean="0"/>
-              <a:t>* One day I said "Sgt., if I </a:t>
-            </a:r>
-            <a:r>
-              <a:rPr lang="en-US" dirty="0" smtClean="0"/>
-              <a:t>didn’t </a:t>
-            </a:r>
-            <a:r>
-              <a:rPr lang="en-US" dirty="0" smtClean="0"/>
-              <a:t>know better I would think you are picking on me."</a:t>
+              <a:t>* One day I said "Sgt., if I didn’t know better I would think you are picking on me."</a:t>
             </a:r>
           </a:p>
           <a:p>
@@ -3221,15 +3204,7 @@
           <a:p>
             <a:r>
               <a:rPr lang="en-US" dirty="0" smtClean="0"/>
-              <a:t>The instructor look at me and said: "Jerry, you still don't get it. This isn't a tactical </a:t>
-            </a:r>
-            <a:r>
-              <a:rPr lang="en-US" dirty="0" smtClean="0"/>
-              <a:t>combat course</a:t>
-            </a:r>
-            <a:r>
-              <a:rPr lang="en-US" dirty="0" smtClean="0"/>
-              <a:t>. This is a *leadership* course."</a:t>
+              <a:t>The instructor look at me and said: "Jerry, you still don't get it. This isn't a tactical combat course. This is a *leadership* course."</a:t>
             </a:r>
           </a:p>
           <a:p>
@@ -3505,15 +3480,7 @@
           <a:p>
             <a:r>
               <a:rPr lang="en-US" dirty="0" smtClean="0"/>
-              <a:t>"You, on the other hand," he continued (still at very high volume) "</a:t>
-            </a:r>
-            <a:r>
-              <a:rPr lang="en-US" dirty="0" smtClean="0"/>
-              <a:t>bitch </a:t>
-            </a:r>
-            <a:r>
-              <a:rPr lang="en-US" dirty="0" smtClean="0"/>
-              <a:t>and whine and moan all the time. For all your talent you're never happy. You stay out all night whenever we're about to get underway and navigate us out of the harbor </a:t>
+              <a:t>"You, on the other hand," he continued (still at very high volume) "bitch and whine and moan all the time. For all your talent you're never happy. You stay out all night whenever we're about to get underway and navigate us out of the harbor </a:t>
             </a:r>
             <a:r>
               <a:rPr lang="en-US" dirty="0" err="1" smtClean="0"/>
@@ -4002,15 +3969,7 @@
           <a:p>
             <a:r>
               <a:rPr lang="en-US" dirty="0" smtClean="0"/>
-              <a:t>I had an opportunity to sit down with the director from a new project. The managers from my project recommended me personally and were as supportive and I could have ever asked them to be. So I'm in this meeting and this director tells me he's ready to hire me today. He's impressed with everything I've done, felt we got along very </a:t>
-            </a:r>
-            <a:r>
-              <a:rPr lang="en-US" dirty="0" smtClean="0"/>
-              <a:t>well, </a:t>
-            </a:r>
-            <a:r>
-              <a:rPr lang="en-US" dirty="0" smtClean="0"/>
-              <a:t>thought I would be a great asset, and wanted me on board ASAP to help him get the project off the ground. There was just one catch. He wanted me to drop out of school.</a:t>
+              <a:t>I had an opportunity to sit down with the director from a new project. The managers from my project recommended me personally and were as supportive and I could have ever asked them to be. So I'm in this meeting and this director tells me he's ready to hire me today. He's impressed with everything I've done, felt we got along very well, thought I would be a great asset, and wanted me on board ASAP to help him get the project off the ground. There was just one catch. He wanted me to drop out of school.</a:t>
             </a:r>
           </a:p>
           <a:p>
@@ -8046,7 +8005,6 @@
               <a:rPr lang="en-US" dirty="0"/>
               <a:t>Good teams stand together</a:t>
             </a:r>
-            <a:endParaRPr lang="en-US" dirty="0"/>
           </a:p>
         </p:txBody>
       </p:sp>
@@ -8189,15 +8147,7 @@
           <a:p>
             <a:r>
               <a:rPr lang="en-US" dirty="0" smtClean="0"/>
-              <a:t>Leave things better than </a:t>
-            </a:r>
-            <a:r>
-              <a:rPr lang="en-US" dirty="0" smtClean="0"/>
-              <a:t>you </a:t>
-            </a:r>
-            <a:r>
-              <a:rPr lang="en-US" dirty="0" smtClean="0"/>
-              <a:t>found them.</a:t>
+              <a:t>Leave things better than you found them.</a:t>
             </a:r>
             <a:endParaRPr lang="en-US" dirty="0"/>
           </a:p>
@@ -9331,7 +9281,6 @@
               <a:rPr lang="en-US" dirty="0" smtClean="0"/>
               <a:t>every member of the team is equally valuable.</a:t>
             </a:r>
-            <a:endParaRPr lang="en-US" dirty="0" smtClean="0"/>
           </a:p>
         </p:txBody>
       </p:sp>

</xml_diff>